<commit_message>
more features added, still need to merge
see pwpt for dataflow tbh. tbh need to manually create the conditional models. too complex for gpt i think
</commit_message>
<xml_diff>
--- a/stonx modelflow.pptx
+++ b/stonx modelflow.pptx
@@ -5,15 +5,18 @@
     <p:sldMasterId id="2147483648" r:id="rId1"/>
   </p:sldMasterIdLst>
   <p:notesMasterIdLst>
-    <p:notesMasterId r:id="rId8"/>
+    <p:notesMasterId r:id="rId11"/>
   </p:notesMasterIdLst>
   <p:sldIdLst>
-    <p:sldId id="256" r:id="rId2"/>
-    <p:sldId id="257" r:id="rId3"/>
-    <p:sldId id="258" r:id="rId4"/>
-    <p:sldId id="259" r:id="rId5"/>
-    <p:sldId id="260" r:id="rId6"/>
-    <p:sldId id="261" r:id="rId7"/>
+    <p:sldId id="262" r:id="rId2"/>
+    <p:sldId id="256" r:id="rId3"/>
+    <p:sldId id="257" r:id="rId4"/>
+    <p:sldId id="258" r:id="rId5"/>
+    <p:sldId id="259" r:id="rId6"/>
+    <p:sldId id="260" r:id="rId7"/>
+    <p:sldId id="261" r:id="rId8"/>
+    <p:sldId id="263" r:id="rId9"/>
+    <p:sldId id="264" r:id="rId10"/>
   </p:sldIdLst>
   <p:sldSz cx="12192000" cy="6858000"/>
   <p:notesSz cx="6858000" cy="9144000"/>
@@ -2513,7 +2516,7 @@
           <a:p>
             <a:fld id="{9C3437D3-C7D5-4C72-87C1-FF9214C70838}" type="slidenum">
               <a:rPr lang="en-US" smtClean="0"/>
-              <a:t>1</a:t>
+              <a:t>2</a:t>
             </a:fld>
             <a:endParaRPr lang="en-US"/>
           </a:p>
@@ -5748,10 +5751,71 @@
       </p:grpSpPr>
       <p:sp>
         <p:nvSpPr>
-          <p:cNvPr id="384" name="Rectangle: Diagonal Corners Rounded 383">
-            <a:extLst>
-              <a:ext uri="{FF2B5EF4-FFF2-40B4-BE49-F238E27FC236}">
-                <a16:creationId xmlns:a16="http://schemas.microsoft.com/office/drawing/2014/main" id="{F226F656-35CD-035C-7FA2-4CA792CC5A22}"/>
+          <p:cNvPr id="2" name="Title 1">
+            <a:extLst>
+              <a:ext uri="{FF2B5EF4-FFF2-40B4-BE49-F238E27FC236}">
+                <a16:creationId xmlns:a16="http://schemas.microsoft.com/office/drawing/2014/main" id="{44B28415-5E23-A74F-EE81-5EB81EEF0157}"/>
+              </a:ext>
+            </a:extLst>
+          </p:cNvPr>
+          <p:cNvSpPr>
+            <a:spLocks noGrp="1"/>
+          </p:cNvSpPr>
+          <p:nvPr>
+            <p:ph type="ctrTitle"/>
+          </p:nvPr>
+        </p:nvSpPr>
+        <p:spPr>
+          <a:xfrm>
+            <a:off x="-137651" y="0"/>
+            <a:ext cx="4168877" cy="560285"/>
+          </a:xfrm>
+        </p:spPr>
+        <p:txBody>
+          <a:bodyPr>
+            <a:normAutofit/>
+          </a:bodyPr>
+          <a:lstStyle/>
+          <a:p>
+            <a:r>
+              <a:rPr lang="en-US" sz="3200" dirty="0" err="1"/>
+              <a:t>disantideambiguation</a:t>
+            </a:r>
+            <a:endParaRPr lang="en-US" sz="3200" dirty="0"/>
+          </a:p>
+        </p:txBody>
+      </p:sp>
+      <p:sp>
+        <p:nvSpPr>
+          <p:cNvPr id="3" name="Subtitle 2">
+            <a:extLst>
+              <a:ext uri="{FF2B5EF4-FFF2-40B4-BE49-F238E27FC236}">
+                <a16:creationId xmlns:a16="http://schemas.microsoft.com/office/drawing/2014/main" id="{71C064C8-D0D3-C117-2A65-90800A0ED477}"/>
+              </a:ext>
+            </a:extLst>
+          </p:cNvPr>
+          <p:cNvSpPr>
+            <a:spLocks noGrp="1"/>
+          </p:cNvSpPr>
+          <p:nvPr>
+            <p:ph type="subTitle" idx="1"/>
+          </p:nvPr>
+        </p:nvSpPr>
+        <p:spPr/>
+        <p:txBody>
+          <a:bodyPr/>
+          <a:lstStyle/>
+          <a:p>
+            <a:endParaRPr lang="en-US"/>
+          </a:p>
+        </p:txBody>
+      </p:sp>
+      <p:sp>
+        <p:nvSpPr>
+          <p:cNvPr id="4" name="Rectangle 3">
+            <a:extLst>
+              <a:ext uri="{FF2B5EF4-FFF2-40B4-BE49-F238E27FC236}">
+                <a16:creationId xmlns:a16="http://schemas.microsoft.com/office/drawing/2014/main" id="{62F832E7-700A-1E68-DA62-67CCE56A3331}"/>
               </a:ext>
             </a:extLst>
           </p:cNvPr>
@@ -5760,7 +5824,307 @@
         </p:nvSpPr>
         <p:spPr>
           <a:xfrm>
-            <a:off x="1782876" y="2573010"/>
+            <a:off x="4791098" y="1083895"/>
+            <a:ext cx="1730335" cy="387144"/>
+          </a:xfrm>
+          <a:prstGeom prst="rect">
+            <a:avLst/>
+          </a:prstGeom>
+        </p:spPr>
+        <p:style>
+          <a:lnRef idx="2">
+            <a:schemeClr val="accent1">
+              <a:shade val="15000"/>
+            </a:schemeClr>
+          </a:lnRef>
+          <a:fillRef idx="1">
+            <a:schemeClr val="accent1"/>
+          </a:fillRef>
+          <a:effectRef idx="0">
+            <a:schemeClr val="accent1"/>
+          </a:effectRef>
+          <a:fontRef idx="minor">
+            <a:schemeClr val="lt1"/>
+          </a:fontRef>
+        </p:style>
+        <p:txBody>
+          <a:bodyPr rtlCol="0" anchor="ctr"/>
+          <a:lstStyle/>
+          <a:p>
+            <a:pPr algn="ctr"/>
+            <a:r>
+              <a:rPr lang="en-US" sz="1050" dirty="0"/>
+              <a:t>Output data file </a:t>
+            </a:r>
+          </a:p>
+          <a:p>
+            <a:pPr algn="ctr"/>
+            <a:r>
+              <a:rPr lang="en-US" sz="1050" dirty="0"/>
+              <a:t>93293 / </a:t>
+            </a:r>
+            <a:r>
+              <a:rPr lang="en-US" sz="1050" dirty="0" err="1"/>
+              <a:t>p,v,fp,mb</a:t>
+            </a:r>
+            <a:endParaRPr lang="en-US" sz="1050" dirty="0"/>
+          </a:p>
+        </p:txBody>
+      </p:sp>
+      <p:cxnSp>
+        <p:nvCxnSpPr>
+          <p:cNvPr id="5" name="Straight Arrow Connector 4">
+            <a:extLst>
+              <a:ext uri="{FF2B5EF4-FFF2-40B4-BE49-F238E27FC236}">
+                <a16:creationId xmlns:a16="http://schemas.microsoft.com/office/drawing/2014/main" id="{31F60B51-B5B5-B50A-6F2D-E6C04618501E}"/>
+              </a:ext>
+            </a:extLst>
+          </p:cNvPr>
+          <p:cNvCxnSpPr>
+            <a:cxnSpLocks/>
+            <a:stCxn id="6" idx="0"/>
+            <a:endCxn id="4" idx="1"/>
+          </p:cNvCxnSpPr>
+          <p:nvPr/>
+        </p:nvCxnSpPr>
+        <p:spPr>
+          <a:xfrm>
+            <a:off x="4367796" y="1277467"/>
+            <a:ext cx="423302" cy="0"/>
+          </a:xfrm>
+          <a:prstGeom prst="straightConnector1">
+            <a:avLst/>
+          </a:prstGeom>
+          <a:ln w="57150">
+            <a:tailEnd type="triangle"/>
+          </a:ln>
+        </p:spPr>
+        <p:style>
+          <a:lnRef idx="2">
+            <a:schemeClr val="accent1"/>
+          </a:lnRef>
+          <a:fillRef idx="0">
+            <a:schemeClr val="accent1"/>
+          </a:fillRef>
+          <a:effectRef idx="1">
+            <a:schemeClr val="accent1"/>
+          </a:effectRef>
+          <a:fontRef idx="minor">
+            <a:schemeClr val="tx1"/>
+          </a:fontRef>
+        </p:style>
+      </p:cxnSp>
+      <p:sp>
+        <p:nvSpPr>
+          <p:cNvPr id="6" name="Rectangle: Diagonal Corners Rounded 5">
+            <a:extLst>
+              <a:ext uri="{FF2B5EF4-FFF2-40B4-BE49-F238E27FC236}">
+                <a16:creationId xmlns:a16="http://schemas.microsoft.com/office/drawing/2014/main" id="{D7DCF569-A149-ED3B-E15F-5431A4926173}"/>
+              </a:ext>
+            </a:extLst>
+          </p:cNvPr>
+          <p:cNvSpPr/>
+          <p:nvPr/>
+        </p:nvSpPr>
+        <p:spPr>
+          <a:xfrm>
+            <a:off x="2974335" y="926944"/>
+            <a:ext cx="1393461" cy="701045"/>
+          </a:xfrm>
+          <a:prstGeom prst="round2DiagRect">
+            <a:avLst>
+              <a:gd name="adj1" fmla="val 16667"/>
+              <a:gd name="adj2" fmla="val 50000"/>
+            </a:avLst>
+          </a:prstGeom>
+          <a:solidFill>
+            <a:schemeClr val="accent1"/>
+          </a:solidFill>
+        </p:spPr>
+        <p:style>
+          <a:lnRef idx="2">
+            <a:schemeClr val="accent1">
+              <a:shade val="15000"/>
+            </a:schemeClr>
+          </a:lnRef>
+          <a:fillRef idx="1">
+            <a:schemeClr val="accent1"/>
+          </a:fillRef>
+          <a:effectRef idx="0">
+            <a:schemeClr val="accent1"/>
+          </a:effectRef>
+          <a:fontRef idx="minor">
+            <a:schemeClr val="lt1"/>
+          </a:fontRef>
+        </p:style>
+        <p:txBody>
+          <a:bodyPr rtlCol="0" anchor="ctr"/>
+          <a:lstStyle/>
+          <a:p>
+            <a:pPr algn="ctr"/>
+            <a:r>
+              <a:rPr lang="en-US" sz="900" b="1" dirty="0"/>
+              <a:t>Processing/script name</a:t>
+            </a:r>
+          </a:p>
+          <a:p>
+            <a:pPr algn="ctr"/>
+            <a:r>
+              <a:rPr lang="en-US" sz="900" dirty="0"/>
+              <a:t>.extension/type</a:t>
+            </a:r>
+          </a:p>
+        </p:txBody>
+      </p:sp>
+      <p:cxnSp>
+        <p:nvCxnSpPr>
+          <p:cNvPr id="7" name="Straight Arrow Connector 6">
+            <a:extLst>
+              <a:ext uri="{FF2B5EF4-FFF2-40B4-BE49-F238E27FC236}">
+                <a16:creationId xmlns:a16="http://schemas.microsoft.com/office/drawing/2014/main" id="{8F2D4123-EB63-A290-A102-B8471BF565C6}"/>
+              </a:ext>
+            </a:extLst>
+          </p:cNvPr>
+          <p:cNvCxnSpPr>
+            <a:cxnSpLocks/>
+            <a:stCxn id="8" idx="3"/>
+            <a:endCxn id="6" idx="2"/>
+          </p:cNvCxnSpPr>
+          <p:nvPr/>
+        </p:nvCxnSpPr>
+        <p:spPr>
+          <a:xfrm>
+            <a:off x="2551034" y="1277467"/>
+            <a:ext cx="423301" cy="0"/>
+          </a:xfrm>
+          <a:prstGeom prst="straightConnector1">
+            <a:avLst/>
+          </a:prstGeom>
+          <a:ln w="57150">
+            <a:tailEnd type="triangle"/>
+          </a:ln>
+        </p:spPr>
+        <p:style>
+          <a:lnRef idx="2">
+            <a:schemeClr val="accent1"/>
+          </a:lnRef>
+          <a:fillRef idx="0">
+            <a:schemeClr val="accent1"/>
+          </a:fillRef>
+          <a:effectRef idx="1">
+            <a:schemeClr val="accent1"/>
+          </a:effectRef>
+          <a:fontRef idx="minor">
+            <a:schemeClr val="tx1"/>
+          </a:fontRef>
+        </p:style>
+      </p:cxnSp>
+      <p:sp>
+        <p:nvSpPr>
+          <p:cNvPr id="8" name="Rectangle 7">
+            <a:extLst>
+              <a:ext uri="{FF2B5EF4-FFF2-40B4-BE49-F238E27FC236}">
+                <a16:creationId xmlns:a16="http://schemas.microsoft.com/office/drawing/2014/main" id="{42E2A7E9-5FFE-B775-5FB5-DACED5C1BF2D}"/>
+              </a:ext>
+            </a:extLst>
+          </p:cNvPr>
+          <p:cNvSpPr/>
+          <p:nvPr/>
+        </p:nvSpPr>
+        <p:spPr>
+          <a:xfrm>
+            <a:off x="806245" y="1083895"/>
+            <a:ext cx="1744789" cy="387144"/>
+          </a:xfrm>
+          <a:prstGeom prst="rect">
+            <a:avLst/>
+          </a:prstGeom>
+        </p:spPr>
+        <p:style>
+          <a:lnRef idx="2">
+            <a:schemeClr val="accent1">
+              <a:shade val="15000"/>
+            </a:schemeClr>
+          </a:lnRef>
+          <a:fillRef idx="1">
+            <a:schemeClr val="accent1"/>
+          </a:fillRef>
+          <a:effectRef idx="0">
+            <a:schemeClr val="accent1"/>
+          </a:effectRef>
+          <a:fontRef idx="minor">
+            <a:schemeClr val="lt1"/>
+          </a:fontRef>
+        </p:style>
+        <p:txBody>
+          <a:bodyPr rtlCol="0" anchor="ctr"/>
+          <a:lstStyle/>
+          <a:p>
+            <a:pPr algn="ctr"/>
+            <a:r>
+              <a:rPr lang="en-US" sz="1050" dirty="0"/>
+              <a:t>Input data source</a:t>
+            </a:r>
+          </a:p>
+          <a:p>
+            <a:pPr algn="ctr"/>
+            <a:r>
+              <a:rPr lang="en-US" sz="1050" dirty="0"/>
+              <a:t>#r / Key data </a:t>
+            </a:r>
+            <a:r>
+              <a:rPr lang="en-US" sz="1050" dirty="0" err="1"/>
+              <a:t>cols+vals</a:t>
+            </a:r>
+            <a:endParaRPr lang="en-US" sz="1050" dirty="0"/>
+          </a:p>
+        </p:txBody>
+      </p:sp>
+    </p:spTree>
+    <p:extLst>
+      <p:ext uri="{BB962C8B-B14F-4D97-AF65-F5344CB8AC3E}">
+        <p14:creationId xmlns:p14="http://schemas.microsoft.com/office/powerpoint/2010/main" val="2715374514"/>
+      </p:ext>
+    </p:extLst>
+  </p:cSld>
+  <p:clrMapOvr>
+    <a:masterClrMapping/>
+  </p:clrMapOvr>
+</p:sld>
+</file>
+
+<file path=ppt/slides/slide2.xml><?xml version="1.0" encoding="utf-8"?>
+<p:sld xmlns:a="http://schemas.openxmlformats.org/drawingml/2006/main" xmlns:r="http://schemas.openxmlformats.org/officeDocument/2006/relationships" xmlns:p="http://schemas.openxmlformats.org/presentationml/2006/main">
+  <p:cSld>
+    <p:spTree>
+      <p:nvGrpSpPr>
+        <p:cNvPr id="1" name=""/>
+        <p:cNvGrpSpPr/>
+        <p:nvPr/>
+      </p:nvGrpSpPr>
+      <p:grpSpPr>
+        <a:xfrm>
+          <a:off x="0" y="0"/>
+          <a:ext cx="0" cy="0"/>
+          <a:chOff x="0" y="0"/>
+          <a:chExt cx="0" cy="0"/>
+        </a:xfrm>
+      </p:grpSpPr>
+      <p:sp>
+        <p:nvSpPr>
+          <p:cNvPr id="384" name="Rectangle: Diagonal Corners Rounded 383">
+            <a:extLst>
+              <a:ext uri="{FF2B5EF4-FFF2-40B4-BE49-F238E27FC236}">
+                <a16:creationId xmlns:a16="http://schemas.microsoft.com/office/drawing/2014/main" id="{F226F656-35CD-035C-7FA2-4CA792CC5A22}"/>
+              </a:ext>
+            </a:extLst>
+          </p:cNvPr>
+          <p:cNvSpPr/>
+          <p:nvPr/>
+        </p:nvSpPr>
+        <p:spPr>
+          <a:xfrm>
+            <a:off x="1782876" y="2543852"/>
             <a:ext cx="985710" cy="444166"/>
           </a:xfrm>
           <a:prstGeom prst="round2DiagRect">
@@ -6815,14 +7179,15 @@
           </p:cNvPr>
           <p:cNvCxnSpPr>
             <a:cxnSpLocks/>
+            <a:stCxn id="70" idx="2"/>
             <a:endCxn id="79" idx="3"/>
           </p:cNvCxnSpPr>
           <p:nvPr/>
         </p:nvCxnSpPr>
         <p:spPr>
           <a:xfrm flipH="1">
-            <a:off x="8114755" y="1277754"/>
-            <a:ext cx="57919" cy="220118"/>
+            <a:off x="8114755" y="1209869"/>
+            <a:ext cx="15185" cy="288003"/>
           </a:xfrm>
           <a:prstGeom prst="straightConnector1">
             <a:avLst/>
@@ -7219,7 +7584,7 @@
                   <a:srgbClr val="FF00FF"/>
                 </a:highlight>
               </a:rPr>
-              <a:t>Sigma compute, trade-wise slice</a:t>
+              <a:t>Sigma + ret compute, trade-wise slice</a:t>
             </a:r>
           </a:p>
         </p:txBody>
@@ -8319,8 +8684,8 @@
         </p:nvCxnSpPr>
         <p:spPr>
           <a:xfrm flipV="1">
-            <a:off x="2275731" y="3017176"/>
-            <a:ext cx="0" cy="318151"/>
+            <a:off x="2275731" y="2988018"/>
+            <a:ext cx="0" cy="347309"/>
           </a:xfrm>
           <a:prstGeom prst="straightConnector1">
             <a:avLst/>
@@ -9355,6 +9720,848 @@
           <a:xfrm>
             <a:off x="3908611" y="307619"/>
             <a:ext cx="534077" cy="496719"/>
+          </a:xfrm>
+          <a:prstGeom prst="straightConnector1">
+            <a:avLst/>
+          </a:prstGeom>
+          <a:ln w="57150">
+            <a:tailEnd type="triangle"/>
+          </a:ln>
+        </p:spPr>
+        <p:style>
+          <a:lnRef idx="2">
+            <a:schemeClr val="accent1"/>
+          </a:lnRef>
+          <a:fillRef idx="0">
+            <a:schemeClr val="accent1"/>
+          </a:fillRef>
+          <a:effectRef idx="1">
+            <a:schemeClr val="accent1"/>
+          </a:effectRef>
+          <a:fontRef idx="minor">
+            <a:schemeClr val="tx1"/>
+          </a:fontRef>
+        </p:style>
+      </p:cxnSp>
+      <p:sp>
+        <p:nvSpPr>
+          <p:cNvPr id="10" name="Rectangle 9">
+            <a:extLst>
+              <a:ext uri="{FF2B5EF4-FFF2-40B4-BE49-F238E27FC236}">
+                <a16:creationId xmlns:a16="http://schemas.microsoft.com/office/drawing/2014/main" id="{17DCAACE-B268-16C1-4CE2-3C5022A6860C}"/>
+              </a:ext>
+            </a:extLst>
+          </p:cNvPr>
+          <p:cNvSpPr/>
+          <p:nvPr/>
+        </p:nvSpPr>
+        <p:spPr>
+          <a:xfrm>
+            <a:off x="7138502" y="6148849"/>
+            <a:ext cx="1514271" cy="1456566"/>
+          </a:xfrm>
+          <a:prstGeom prst="rect">
+            <a:avLst/>
+          </a:prstGeom>
+          <a:solidFill>
+            <a:schemeClr val="accent1"/>
+          </a:solidFill>
+        </p:spPr>
+        <p:style>
+          <a:lnRef idx="2">
+            <a:schemeClr val="accent1">
+              <a:shade val="15000"/>
+            </a:schemeClr>
+          </a:lnRef>
+          <a:fillRef idx="1">
+            <a:schemeClr val="accent1"/>
+          </a:fillRef>
+          <a:effectRef idx="0">
+            <a:schemeClr val="accent1"/>
+          </a:effectRef>
+          <a:fontRef idx="minor">
+            <a:schemeClr val="lt1"/>
+          </a:fontRef>
+        </p:style>
+        <p:txBody>
+          <a:bodyPr rtlCol="0" anchor="ctr"/>
+          <a:lstStyle/>
+          <a:p>
+            <a:pPr algn="ctr"/>
+            <a:r>
+              <a:rPr lang="en-US" sz="900" dirty="0">
+                <a:highlight>
+                  <a:srgbClr val="FF00FF"/>
+                </a:highlight>
+              </a:rPr>
+              <a:t>Ask GPT stats q:</a:t>
+            </a:r>
+          </a:p>
+          <a:p>
+            <a:pPr algn="ctr"/>
+            <a:r>
+              <a:rPr lang="en-US" sz="900" dirty="0">
+                <a:highlight>
+                  <a:srgbClr val="FF00FF"/>
+                </a:highlight>
+              </a:rPr>
+              <a:t>Which to normalize/log </a:t>
+            </a:r>
+            <a:r>
+              <a:rPr lang="en-US" sz="900" dirty="0" err="1">
+                <a:highlight>
+                  <a:srgbClr val="FF00FF"/>
+                </a:highlight>
+              </a:rPr>
+              <a:t>tform</a:t>
+            </a:r>
+            <a:r>
+              <a:rPr lang="en-US" sz="900" dirty="0">
+                <a:highlight>
+                  <a:srgbClr val="FF00FF"/>
+                </a:highlight>
+              </a:rPr>
+              <a:t> </a:t>
+            </a:r>
+            <a:r>
+              <a:rPr lang="en-US" sz="900" dirty="0" err="1">
+                <a:highlight>
+                  <a:srgbClr val="FF00FF"/>
+                </a:highlight>
+              </a:rPr>
+              <a:t>etc</a:t>
+            </a:r>
+            <a:r>
+              <a:rPr lang="en-US" sz="900" dirty="0">
+                <a:highlight>
+                  <a:srgbClr val="FF00FF"/>
+                </a:highlight>
+              </a:rPr>
+              <a:t>, and how? across ticker? Across trade lookback? Across all tickers? Across all trades? Give context of strategy/how model is </a:t>
+            </a:r>
+            <a:r>
+              <a:rPr lang="en-US" sz="900" dirty="0" err="1">
+                <a:highlight>
+                  <a:srgbClr val="FF00FF"/>
+                </a:highlight>
+              </a:rPr>
+              <a:t>implem</a:t>
+            </a:r>
+            <a:r>
+              <a:rPr lang="en-US" sz="900" dirty="0">
+                <a:highlight>
+                  <a:srgbClr val="FF00FF"/>
+                </a:highlight>
+              </a:rPr>
+              <a:t>/</a:t>
+            </a:r>
+            <a:r>
+              <a:rPr lang="en-US" sz="900" dirty="0" err="1">
+                <a:highlight>
+                  <a:srgbClr val="FF00FF"/>
+                </a:highlight>
+              </a:rPr>
+              <a:t>etc</a:t>
+            </a:r>
+            <a:endParaRPr lang="en-US" sz="900" dirty="0">
+              <a:highlight>
+                <a:srgbClr val="FF00FF"/>
+              </a:highlight>
+            </a:endParaRPr>
+          </a:p>
+        </p:txBody>
+      </p:sp>
+      <p:sp>
+        <p:nvSpPr>
+          <p:cNvPr id="11" name="Rectangle 10">
+            <a:extLst>
+              <a:ext uri="{FF2B5EF4-FFF2-40B4-BE49-F238E27FC236}">
+                <a16:creationId xmlns:a16="http://schemas.microsoft.com/office/drawing/2014/main" id="{C4E067D3-1D64-29AF-E4BC-7A2923C4D1FE}"/>
+              </a:ext>
+            </a:extLst>
+          </p:cNvPr>
+          <p:cNvSpPr/>
+          <p:nvPr/>
+        </p:nvSpPr>
+        <p:spPr>
+          <a:xfrm>
+            <a:off x="174970" y="4478061"/>
+            <a:ext cx="985710" cy="387144"/>
+          </a:xfrm>
+          <a:prstGeom prst="rect">
+            <a:avLst/>
+          </a:prstGeom>
+        </p:spPr>
+        <p:style>
+          <a:lnRef idx="2">
+            <a:schemeClr val="accent1">
+              <a:shade val="15000"/>
+            </a:schemeClr>
+          </a:lnRef>
+          <a:fillRef idx="1">
+            <a:schemeClr val="accent1"/>
+          </a:fillRef>
+          <a:effectRef idx="0">
+            <a:schemeClr val="accent1"/>
+          </a:effectRef>
+          <a:fontRef idx="minor">
+            <a:schemeClr val="lt1"/>
+          </a:fontRef>
+        </p:style>
+        <p:txBody>
+          <a:bodyPr rtlCol="0" anchor="ctr"/>
+          <a:lstStyle/>
+          <a:p>
+            <a:pPr algn="ctr"/>
+            <a:r>
+              <a:rPr lang="en-US" sz="1050" dirty="0" err="1"/>
+              <a:t>Yf</a:t>
+            </a:r>
+            <a:r>
+              <a:rPr lang="en-US" sz="1050" dirty="0"/>
+              <a:t> API</a:t>
+            </a:r>
+          </a:p>
+          <a:p>
+            <a:pPr algn="ctr"/>
+            <a:r>
+              <a:rPr lang="en-US" sz="1050" dirty="0"/>
+              <a:t>^GSPC, SPY</a:t>
+            </a:r>
+          </a:p>
+        </p:txBody>
+      </p:sp>
+      <p:cxnSp>
+        <p:nvCxnSpPr>
+          <p:cNvPr id="12" name="Straight Arrow Connector 11">
+            <a:extLst>
+              <a:ext uri="{FF2B5EF4-FFF2-40B4-BE49-F238E27FC236}">
+                <a16:creationId xmlns:a16="http://schemas.microsoft.com/office/drawing/2014/main" id="{DCB61157-14FF-D481-DC20-2197D5676745}"/>
+              </a:ext>
+            </a:extLst>
+          </p:cNvPr>
+          <p:cNvCxnSpPr>
+            <a:cxnSpLocks/>
+            <a:stCxn id="11" idx="3"/>
+            <a:endCxn id="17" idx="2"/>
+          </p:cNvCxnSpPr>
+          <p:nvPr/>
+        </p:nvCxnSpPr>
+        <p:spPr>
+          <a:xfrm>
+            <a:off x="1160680" y="4671633"/>
+            <a:ext cx="425872" cy="51867"/>
+          </a:xfrm>
+          <a:prstGeom prst="straightConnector1">
+            <a:avLst/>
+          </a:prstGeom>
+          <a:ln w="57150">
+            <a:tailEnd type="triangle"/>
+          </a:ln>
+        </p:spPr>
+        <p:style>
+          <a:lnRef idx="2">
+            <a:schemeClr val="accent1"/>
+          </a:lnRef>
+          <a:fillRef idx="0">
+            <a:schemeClr val="accent1"/>
+          </a:fillRef>
+          <a:effectRef idx="1">
+            <a:schemeClr val="accent1"/>
+          </a:effectRef>
+          <a:fontRef idx="minor">
+            <a:schemeClr val="tx1"/>
+          </a:fontRef>
+        </p:style>
+      </p:cxnSp>
+      <p:sp>
+        <p:nvSpPr>
+          <p:cNvPr id="17" name="Rectangle: Diagonal Corners Rounded 16">
+            <a:extLst>
+              <a:ext uri="{FF2B5EF4-FFF2-40B4-BE49-F238E27FC236}">
+                <a16:creationId xmlns:a16="http://schemas.microsoft.com/office/drawing/2014/main" id="{1E1B18ED-D10A-8D94-4DC4-8E862DF68DB8}"/>
+              </a:ext>
+            </a:extLst>
+          </p:cNvPr>
+          <p:cNvSpPr/>
+          <p:nvPr/>
+        </p:nvSpPr>
+        <p:spPr>
+          <a:xfrm>
+            <a:off x="1586552" y="4501417"/>
+            <a:ext cx="1033264" cy="444166"/>
+          </a:xfrm>
+          <a:prstGeom prst="round2DiagRect">
+            <a:avLst>
+              <a:gd name="adj1" fmla="val 16667"/>
+              <a:gd name="adj2" fmla="val 50000"/>
+            </a:avLst>
+          </a:prstGeom>
+          <a:solidFill>
+            <a:schemeClr val="accent1"/>
+          </a:solidFill>
+        </p:spPr>
+        <p:style>
+          <a:lnRef idx="2">
+            <a:schemeClr val="accent1">
+              <a:shade val="15000"/>
+            </a:schemeClr>
+          </a:lnRef>
+          <a:fillRef idx="1">
+            <a:schemeClr val="accent1"/>
+          </a:fillRef>
+          <a:effectRef idx="0">
+            <a:schemeClr val="accent1"/>
+          </a:effectRef>
+          <a:fontRef idx="minor">
+            <a:schemeClr val="lt1"/>
+          </a:fontRef>
+        </p:style>
+        <p:txBody>
+          <a:bodyPr rtlCol="0" anchor="ctr"/>
+          <a:lstStyle/>
+          <a:p>
+            <a:pPr algn="ctr"/>
+            <a:r>
+              <a:rPr lang="en-US" sz="900" b="1" dirty="0"/>
+              <a:t>SNP500getter .ipynb</a:t>
+            </a:r>
+            <a:endParaRPr lang="en-US" sz="900" dirty="0"/>
+          </a:p>
+        </p:txBody>
+      </p:sp>
+      <p:cxnSp>
+        <p:nvCxnSpPr>
+          <p:cNvPr id="23" name="Straight Arrow Connector 22">
+            <a:extLst>
+              <a:ext uri="{FF2B5EF4-FFF2-40B4-BE49-F238E27FC236}">
+                <a16:creationId xmlns:a16="http://schemas.microsoft.com/office/drawing/2014/main" id="{91F7E8B2-1574-A2D9-8E0D-FDC61FF02CA3}"/>
+              </a:ext>
+            </a:extLst>
+          </p:cNvPr>
+          <p:cNvCxnSpPr>
+            <a:cxnSpLocks/>
+            <a:stCxn id="17" idx="0"/>
+            <a:endCxn id="26" idx="1"/>
+          </p:cNvCxnSpPr>
+          <p:nvPr/>
+        </p:nvCxnSpPr>
+        <p:spPr>
+          <a:xfrm flipV="1">
+            <a:off x="2619816" y="4719124"/>
+            <a:ext cx="194172" cy="4376"/>
+          </a:xfrm>
+          <a:prstGeom prst="straightConnector1">
+            <a:avLst/>
+          </a:prstGeom>
+          <a:ln w="57150">
+            <a:tailEnd type="triangle"/>
+          </a:ln>
+        </p:spPr>
+        <p:style>
+          <a:lnRef idx="2">
+            <a:schemeClr val="accent1"/>
+          </a:lnRef>
+          <a:fillRef idx="0">
+            <a:schemeClr val="accent1"/>
+          </a:fillRef>
+          <a:effectRef idx="1">
+            <a:schemeClr val="accent1"/>
+          </a:effectRef>
+          <a:fontRef idx="minor">
+            <a:schemeClr val="tx1"/>
+          </a:fontRef>
+        </p:style>
+      </p:cxnSp>
+      <p:sp>
+        <p:nvSpPr>
+          <p:cNvPr id="26" name="Rectangle 25">
+            <a:extLst>
+              <a:ext uri="{FF2B5EF4-FFF2-40B4-BE49-F238E27FC236}">
+                <a16:creationId xmlns:a16="http://schemas.microsoft.com/office/drawing/2014/main" id="{C8847C24-894D-0D7B-23D0-0CC923745A99}"/>
+              </a:ext>
+            </a:extLst>
+          </p:cNvPr>
+          <p:cNvSpPr/>
+          <p:nvPr/>
+        </p:nvSpPr>
+        <p:spPr>
+          <a:xfrm>
+            <a:off x="2813988" y="4525552"/>
+            <a:ext cx="1842217" cy="387144"/>
+          </a:xfrm>
+          <a:prstGeom prst="rect">
+            <a:avLst/>
+          </a:prstGeom>
+        </p:spPr>
+        <p:style>
+          <a:lnRef idx="2">
+            <a:schemeClr val="accent1">
+              <a:shade val="15000"/>
+            </a:schemeClr>
+          </a:lnRef>
+          <a:fillRef idx="1">
+            <a:schemeClr val="accent1"/>
+          </a:fillRef>
+          <a:effectRef idx="0">
+            <a:schemeClr val="accent1"/>
+          </a:effectRef>
+          <a:fontRef idx="minor">
+            <a:schemeClr val="lt1"/>
+          </a:fontRef>
+        </p:style>
+        <p:txBody>
+          <a:bodyPr rtlCol="0" anchor="ctr"/>
+          <a:lstStyle/>
+          <a:p>
+            <a:pPr algn="ctr"/>
+            <a:r>
+              <a:rPr lang="en-US" sz="1050" dirty="0"/>
+              <a:t>Sp500_ft1.csv</a:t>
+            </a:r>
+          </a:p>
+          <a:p>
+            <a:pPr algn="ctr"/>
+            <a:r>
+              <a:rPr lang="en-US" sz="1050" dirty="0"/>
+              <a:t>Daily </a:t>
+            </a:r>
+            <a:r>
+              <a:rPr lang="en-US" sz="1050" dirty="0" err="1"/>
+              <a:t>snp</a:t>
+            </a:r>
+            <a:r>
+              <a:rPr lang="en-US" sz="1050" dirty="0"/>
+              <a:t> metrics Nov1,2018</a:t>
+            </a:r>
+          </a:p>
+        </p:txBody>
+      </p:sp>
+      <p:sp>
+        <p:nvSpPr>
+          <p:cNvPr id="29" name="Rectangle 28">
+            <a:extLst>
+              <a:ext uri="{FF2B5EF4-FFF2-40B4-BE49-F238E27FC236}">
+                <a16:creationId xmlns:a16="http://schemas.microsoft.com/office/drawing/2014/main" id="{41DC3B39-1848-5330-79AD-54AEF55A30D2}"/>
+              </a:ext>
+            </a:extLst>
+          </p:cNvPr>
+          <p:cNvSpPr/>
+          <p:nvPr/>
+        </p:nvSpPr>
+        <p:spPr>
+          <a:xfrm>
+            <a:off x="129568" y="5576265"/>
+            <a:ext cx="985710" cy="387144"/>
+          </a:xfrm>
+          <a:prstGeom prst="rect">
+            <a:avLst/>
+          </a:prstGeom>
+        </p:spPr>
+        <p:style>
+          <a:lnRef idx="2">
+            <a:schemeClr val="accent1">
+              <a:shade val="15000"/>
+            </a:schemeClr>
+          </a:lnRef>
+          <a:fillRef idx="1">
+            <a:schemeClr val="accent1"/>
+          </a:fillRef>
+          <a:effectRef idx="0">
+            <a:schemeClr val="accent1"/>
+          </a:effectRef>
+          <a:fontRef idx="minor">
+            <a:schemeClr val="lt1"/>
+          </a:fontRef>
+        </p:style>
+        <p:txBody>
+          <a:bodyPr rtlCol="0" anchor="ctr"/>
+          <a:lstStyle/>
+          <a:p>
+            <a:pPr algn="ctr"/>
+            <a:r>
+              <a:rPr lang="en-US" sz="1050" dirty="0" err="1"/>
+              <a:t>Yf</a:t>
+            </a:r>
+            <a:r>
+              <a:rPr lang="en-US" sz="1050" dirty="0"/>
+              <a:t> API</a:t>
+            </a:r>
+          </a:p>
+          <a:p>
+            <a:pPr algn="ctr"/>
+            <a:r>
+              <a:rPr lang="en-US" sz="1050" dirty="0"/>
+              <a:t>^GSPC, SPY</a:t>
+            </a:r>
+          </a:p>
+        </p:txBody>
+      </p:sp>
+      <p:cxnSp>
+        <p:nvCxnSpPr>
+          <p:cNvPr id="30" name="Straight Arrow Connector 29">
+            <a:extLst>
+              <a:ext uri="{FF2B5EF4-FFF2-40B4-BE49-F238E27FC236}">
+                <a16:creationId xmlns:a16="http://schemas.microsoft.com/office/drawing/2014/main" id="{5BBCE123-651A-6DFB-5F74-AD6DE3E53D6A}"/>
+              </a:ext>
+            </a:extLst>
+          </p:cNvPr>
+          <p:cNvCxnSpPr>
+            <a:cxnSpLocks/>
+            <a:stCxn id="29" idx="3"/>
+            <a:endCxn id="31" idx="2"/>
+          </p:cNvCxnSpPr>
+          <p:nvPr/>
+        </p:nvCxnSpPr>
+        <p:spPr>
+          <a:xfrm>
+            <a:off x="1115278" y="5769837"/>
+            <a:ext cx="366837" cy="51867"/>
+          </a:xfrm>
+          <a:prstGeom prst="straightConnector1">
+            <a:avLst/>
+          </a:prstGeom>
+          <a:ln w="57150">
+            <a:tailEnd type="triangle"/>
+          </a:ln>
+        </p:spPr>
+        <p:style>
+          <a:lnRef idx="2">
+            <a:schemeClr val="accent1"/>
+          </a:lnRef>
+          <a:fillRef idx="0">
+            <a:schemeClr val="accent1"/>
+          </a:fillRef>
+          <a:effectRef idx="1">
+            <a:schemeClr val="accent1"/>
+          </a:effectRef>
+          <a:fontRef idx="minor">
+            <a:schemeClr val="tx1"/>
+          </a:fontRef>
+        </p:style>
+      </p:cxnSp>
+      <p:sp>
+        <p:nvSpPr>
+          <p:cNvPr id="31" name="Rectangle: Diagonal Corners Rounded 30">
+            <a:extLst>
+              <a:ext uri="{FF2B5EF4-FFF2-40B4-BE49-F238E27FC236}">
+                <a16:creationId xmlns:a16="http://schemas.microsoft.com/office/drawing/2014/main" id="{238913A3-D162-C0F5-0401-8CB48CD31675}"/>
+              </a:ext>
+            </a:extLst>
+          </p:cNvPr>
+          <p:cNvSpPr/>
+          <p:nvPr/>
+        </p:nvSpPr>
+        <p:spPr>
+          <a:xfrm>
+            <a:off x="1482115" y="5599621"/>
+            <a:ext cx="1092299" cy="444166"/>
+          </a:xfrm>
+          <a:prstGeom prst="round2DiagRect">
+            <a:avLst>
+              <a:gd name="adj1" fmla="val 16667"/>
+              <a:gd name="adj2" fmla="val 50000"/>
+            </a:avLst>
+          </a:prstGeom>
+          <a:solidFill>
+            <a:schemeClr val="accent1"/>
+          </a:solidFill>
+        </p:spPr>
+        <p:style>
+          <a:lnRef idx="2">
+            <a:schemeClr val="accent1">
+              <a:shade val="15000"/>
+            </a:schemeClr>
+          </a:lnRef>
+          <a:fillRef idx="1">
+            <a:schemeClr val="accent1"/>
+          </a:fillRef>
+          <a:effectRef idx="0">
+            <a:schemeClr val="accent1"/>
+          </a:effectRef>
+          <a:fontRef idx="minor">
+            <a:schemeClr val="lt1"/>
+          </a:fontRef>
+        </p:style>
+        <p:txBody>
+          <a:bodyPr rtlCol="0" anchor="ctr"/>
+          <a:lstStyle/>
+          <a:p>
+            <a:pPr algn="ctr"/>
+            <a:r>
+              <a:rPr lang="en-US" sz="900" b="1" dirty="0"/>
+              <a:t>morefeatures1 .ipynb</a:t>
+            </a:r>
+            <a:endParaRPr lang="en-US" sz="900" dirty="0"/>
+          </a:p>
+        </p:txBody>
+      </p:sp>
+      <p:cxnSp>
+        <p:nvCxnSpPr>
+          <p:cNvPr id="32" name="Straight Arrow Connector 31">
+            <a:extLst>
+              <a:ext uri="{FF2B5EF4-FFF2-40B4-BE49-F238E27FC236}">
+                <a16:creationId xmlns:a16="http://schemas.microsoft.com/office/drawing/2014/main" id="{639B4481-FD6B-D8D0-9651-15A0BD0623D6}"/>
+              </a:ext>
+            </a:extLst>
+          </p:cNvPr>
+          <p:cNvCxnSpPr>
+            <a:cxnSpLocks/>
+            <a:stCxn id="31" idx="0"/>
+            <a:endCxn id="33" idx="1"/>
+          </p:cNvCxnSpPr>
+          <p:nvPr/>
+        </p:nvCxnSpPr>
+        <p:spPr>
+          <a:xfrm flipV="1">
+            <a:off x="2574414" y="5565397"/>
+            <a:ext cx="158128" cy="256307"/>
+          </a:xfrm>
+          <a:prstGeom prst="straightConnector1">
+            <a:avLst/>
+          </a:prstGeom>
+          <a:ln w="57150">
+            <a:tailEnd type="triangle"/>
+          </a:ln>
+        </p:spPr>
+        <p:style>
+          <a:lnRef idx="2">
+            <a:schemeClr val="accent1"/>
+          </a:lnRef>
+          <a:fillRef idx="0">
+            <a:schemeClr val="accent1"/>
+          </a:fillRef>
+          <a:effectRef idx="1">
+            <a:schemeClr val="accent1"/>
+          </a:effectRef>
+          <a:fontRef idx="minor">
+            <a:schemeClr val="tx1"/>
+          </a:fontRef>
+        </p:style>
+      </p:cxnSp>
+      <p:sp>
+        <p:nvSpPr>
+          <p:cNvPr id="33" name="Rectangle 32">
+            <a:extLst>
+              <a:ext uri="{FF2B5EF4-FFF2-40B4-BE49-F238E27FC236}">
+                <a16:creationId xmlns:a16="http://schemas.microsoft.com/office/drawing/2014/main" id="{3EE860B8-CD94-EAE3-1209-90AB0D3A0B92}"/>
+              </a:ext>
+            </a:extLst>
+          </p:cNvPr>
+          <p:cNvSpPr/>
+          <p:nvPr/>
+        </p:nvSpPr>
+        <p:spPr>
+          <a:xfrm>
+            <a:off x="2732542" y="5130403"/>
+            <a:ext cx="1961642" cy="869987"/>
+          </a:xfrm>
+          <a:prstGeom prst="rect">
+            <a:avLst/>
+          </a:prstGeom>
+        </p:spPr>
+        <p:style>
+          <a:lnRef idx="2">
+            <a:schemeClr val="accent1">
+              <a:shade val="15000"/>
+            </a:schemeClr>
+          </a:lnRef>
+          <a:fillRef idx="1">
+            <a:schemeClr val="accent1"/>
+          </a:fillRef>
+          <a:effectRef idx="0">
+            <a:schemeClr val="accent1"/>
+          </a:effectRef>
+          <a:fontRef idx="minor">
+            <a:schemeClr val="lt1"/>
+          </a:fontRef>
+        </p:style>
+        <p:txBody>
+          <a:bodyPr rtlCol="0" anchor="ctr"/>
+          <a:lstStyle/>
+          <a:p>
+            <a:pPr algn="ctr"/>
+            <a:r>
+              <a:rPr lang="en-US" sz="1050" dirty="0"/>
+              <a:t>Oip_mega_boost1.csv</a:t>
+            </a:r>
+          </a:p>
+          <a:p>
+            <a:pPr algn="ctr"/>
+            <a:r>
+              <a:rPr lang="en-US" sz="1050" dirty="0">
+                <a:solidFill>
+                  <a:srgbClr val="FF0000"/>
+                </a:solidFill>
+              </a:rPr>
+              <a:t>73494rows, 4183stocks</a:t>
+            </a:r>
+          </a:p>
+          <a:p>
+            <a:pPr algn="ctr"/>
+            <a:r>
+              <a:rPr lang="en-US" sz="1050" dirty="0"/>
+              <a:t>+ </a:t>
+            </a:r>
+            <a:r>
+              <a:rPr lang="en-US" sz="1050" dirty="0" err="1"/>
+              <a:t>Purchase_pct_mcap</a:t>
+            </a:r>
+            <a:r>
+              <a:rPr lang="en-US" sz="1050" dirty="0"/>
+              <a:t>, </a:t>
+            </a:r>
+            <a:r>
+              <a:rPr lang="en-US" sz="1050" dirty="0" err="1"/>
+              <a:t>tradefile_td</a:t>
+            </a:r>
+            <a:r>
+              <a:rPr lang="en-US" sz="1050" dirty="0"/>
+              <a:t>, </a:t>
+            </a:r>
+            <a:r>
+              <a:rPr lang="en-US" sz="1050" dirty="0" err="1"/>
+              <a:t>ret_trade_to_mebuy</a:t>
+            </a:r>
+            <a:endParaRPr lang="en-US" sz="1050" dirty="0"/>
+          </a:p>
+        </p:txBody>
+      </p:sp>
+      <p:cxnSp>
+        <p:nvCxnSpPr>
+          <p:cNvPr id="40" name="Straight Arrow Connector 39">
+            <a:extLst>
+              <a:ext uri="{FF2B5EF4-FFF2-40B4-BE49-F238E27FC236}">
+                <a16:creationId xmlns:a16="http://schemas.microsoft.com/office/drawing/2014/main" id="{8D42F1A0-171E-3C02-6FE6-C36549B4A338}"/>
+              </a:ext>
+            </a:extLst>
+          </p:cNvPr>
+          <p:cNvCxnSpPr>
+            <a:cxnSpLocks/>
+            <a:stCxn id="33" idx="3"/>
+            <a:endCxn id="43" idx="2"/>
+          </p:cNvCxnSpPr>
+          <p:nvPr/>
+        </p:nvCxnSpPr>
+        <p:spPr>
+          <a:xfrm flipV="1">
+            <a:off x="4694184" y="5099602"/>
+            <a:ext cx="193573" cy="465795"/>
+          </a:xfrm>
+          <a:prstGeom prst="straightConnector1">
+            <a:avLst/>
+          </a:prstGeom>
+          <a:ln w="57150">
+            <a:tailEnd type="triangle"/>
+          </a:ln>
+        </p:spPr>
+        <p:style>
+          <a:lnRef idx="2">
+            <a:schemeClr val="accent1"/>
+          </a:lnRef>
+          <a:fillRef idx="0">
+            <a:schemeClr val="accent1"/>
+          </a:fillRef>
+          <a:effectRef idx="1">
+            <a:schemeClr val="accent1"/>
+          </a:effectRef>
+          <a:fontRef idx="minor">
+            <a:schemeClr val="tx1"/>
+          </a:fontRef>
+        </p:style>
+      </p:cxnSp>
+      <p:sp>
+        <p:nvSpPr>
+          <p:cNvPr id="43" name="Rectangle: Diagonal Corners Rounded 42">
+            <a:extLst>
+              <a:ext uri="{FF2B5EF4-FFF2-40B4-BE49-F238E27FC236}">
+                <a16:creationId xmlns:a16="http://schemas.microsoft.com/office/drawing/2014/main" id="{DCCD24E1-9260-88C5-D42B-0D837A9A5664}"/>
+              </a:ext>
+            </a:extLst>
+          </p:cNvPr>
+          <p:cNvSpPr/>
+          <p:nvPr/>
+        </p:nvSpPr>
+        <p:spPr>
+          <a:xfrm>
+            <a:off x="4887757" y="4877519"/>
+            <a:ext cx="1033264" cy="444166"/>
+          </a:xfrm>
+          <a:prstGeom prst="round2DiagRect">
+            <a:avLst>
+              <a:gd name="adj1" fmla="val 16667"/>
+              <a:gd name="adj2" fmla="val 50000"/>
+            </a:avLst>
+          </a:prstGeom>
+          <a:solidFill>
+            <a:schemeClr val="accent1"/>
+          </a:solidFill>
+        </p:spPr>
+        <p:style>
+          <a:lnRef idx="2">
+            <a:schemeClr val="accent1">
+              <a:shade val="15000"/>
+            </a:schemeClr>
+          </a:lnRef>
+          <a:fillRef idx="1">
+            <a:schemeClr val="accent1"/>
+          </a:fillRef>
+          <a:effectRef idx="0">
+            <a:schemeClr val="accent1"/>
+          </a:effectRef>
+          <a:fontRef idx="minor">
+            <a:schemeClr val="lt1"/>
+          </a:fontRef>
+        </p:style>
+        <p:txBody>
+          <a:bodyPr rtlCol="0" anchor="ctr"/>
+          <a:lstStyle/>
+          <a:p>
+            <a:pPr algn="ctr"/>
+            <a:r>
+              <a:rPr lang="en-US" sz="900" b="1" dirty="0">
+                <a:highlight>
+                  <a:srgbClr val="FF00FF"/>
+                </a:highlight>
+              </a:rPr>
+              <a:t>Needs merge/infill w OG </a:t>
+            </a:r>
+            <a:r>
+              <a:rPr lang="en-US" sz="900" b="1" dirty="0" err="1">
+                <a:highlight>
+                  <a:srgbClr val="FF00FF"/>
+                </a:highlight>
+              </a:rPr>
+              <a:t>tbh</a:t>
+            </a:r>
+            <a:endParaRPr lang="en-US" sz="900" dirty="0">
+              <a:highlight>
+                <a:srgbClr val="FF00FF"/>
+              </a:highlight>
+            </a:endParaRPr>
+          </a:p>
+        </p:txBody>
+      </p:sp>
+      <p:cxnSp>
+        <p:nvCxnSpPr>
+          <p:cNvPr id="46" name="Straight Arrow Connector 45">
+            <a:extLst>
+              <a:ext uri="{FF2B5EF4-FFF2-40B4-BE49-F238E27FC236}">
+                <a16:creationId xmlns:a16="http://schemas.microsoft.com/office/drawing/2014/main" id="{0A9FC234-4CE2-6016-A591-669841F11B63}"/>
+              </a:ext>
+            </a:extLst>
+          </p:cNvPr>
+          <p:cNvCxnSpPr>
+            <a:cxnSpLocks/>
+            <a:stCxn id="43" idx="0"/>
+            <a:endCxn id="319" idx="0"/>
+          </p:cNvCxnSpPr>
+          <p:nvPr/>
+        </p:nvCxnSpPr>
+        <p:spPr>
+          <a:xfrm>
+            <a:off x="5921021" y="5099602"/>
+            <a:ext cx="287434" cy="326096"/>
           </a:xfrm>
           <a:prstGeom prst="straightConnector1">
             <a:avLst/>
@@ -9396,7 +10603,7 @@
 </p:sld>
 </file>
 
-<file path=ppt/slides/slide2.xml><?xml version="1.0" encoding="utf-8"?>
+<file path=ppt/slides/slide3.xml><?xml version="1.0" encoding="utf-8"?>
 <p:sld xmlns:a="http://schemas.openxmlformats.org/drawingml/2006/main" xmlns:r="http://schemas.openxmlformats.org/officeDocument/2006/relationships" xmlns:p="http://schemas.openxmlformats.org/presentationml/2006/main">
   <p:cSld>
     <p:spTree>
@@ -10327,7 +11534,7 @@
         </p:nvSpPr>
         <p:spPr>
           <a:xfrm>
-            <a:off x="2659551" y="3687036"/>
+            <a:off x="2659551" y="3494201"/>
             <a:ext cx="1602149" cy="703989"/>
           </a:xfrm>
           <a:prstGeom prst="rect">
@@ -10464,7 +11671,7 @@
         </p:nvSpPr>
         <p:spPr>
           <a:xfrm>
-            <a:off x="5570220" y="3871248"/>
+            <a:off x="168349" y="4391025"/>
             <a:ext cx="2602962" cy="2234584"/>
           </a:xfrm>
           <a:prstGeom prst="rect">
@@ -10498,7 +11705,7 @@
                   <a:srgbClr val="FF00FF"/>
                 </a:highlight>
               </a:rPr>
-              <a:t>Test predicted hold duration </a:t>
+              <a:t>(re) Test predicted hold duration </a:t>
             </a:r>
             <a:r>
               <a:rPr lang="en-US" sz="1000" dirty="0" err="1">
@@ -10546,6 +11753,14 @@
           </a:p>
           <a:p>
             <a:pPr algn="ctr"/>
+            <a:endParaRPr lang="en-US" sz="1000" dirty="0">
+              <a:highlight>
+                <a:srgbClr val="FF00FF"/>
+              </a:highlight>
+            </a:endParaRPr>
+          </a:p>
+          <a:p>
+            <a:pPr algn="ctr"/>
             <a:r>
               <a:rPr lang="en-US" sz="1000" dirty="0" err="1">
                 <a:highlight>
@@ -10591,6 +11806,336 @@
                 <a:srgbClr val="FF00FF"/>
               </a:highlight>
             </a:endParaRPr>
+          </a:p>
+        </p:txBody>
+      </p:sp>
+      <p:sp>
+        <p:nvSpPr>
+          <p:cNvPr id="7" name="Rectangle 6">
+            <a:extLst>
+              <a:ext uri="{FF2B5EF4-FFF2-40B4-BE49-F238E27FC236}">
+                <a16:creationId xmlns:a16="http://schemas.microsoft.com/office/drawing/2014/main" id="{98FE9331-DA27-DFCC-7AAA-80AD9D109F69}"/>
+              </a:ext>
+            </a:extLst>
+          </p:cNvPr>
+          <p:cNvSpPr/>
+          <p:nvPr/>
+        </p:nvSpPr>
+        <p:spPr>
+          <a:xfrm>
+            <a:off x="3086692" y="4403316"/>
+            <a:ext cx="2602962" cy="2234584"/>
+          </a:xfrm>
+          <a:prstGeom prst="rect">
+            <a:avLst/>
+          </a:prstGeom>
+        </p:spPr>
+        <p:style>
+          <a:lnRef idx="2">
+            <a:schemeClr val="accent1">
+              <a:shade val="15000"/>
+            </a:schemeClr>
+          </a:lnRef>
+          <a:fillRef idx="1">
+            <a:schemeClr val="accent1"/>
+          </a:fillRef>
+          <a:effectRef idx="0">
+            <a:schemeClr val="accent1"/>
+          </a:effectRef>
+          <a:fontRef idx="minor">
+            <a:schemeClr val="lt1"/>
+          </a:fontRef>
+        </p:style>
+        <p:txBody>
+          <a:bodyPr rtlCol="0" anchor="ctr"/>
+          <a:lstStyle/>
+          <a:p>
+            <a:pPr algn="ctr"/>
+            <a:r>
+              <a:rPr lang="en-US" sz="1000" dirty="0">
+                <a:highlight>
+                  <a:srgbClr val="FF00FF"/>
+                </a:highlight>
+              </a:rPr>
+              <a:t>Within a ticker/class:</a:t>
+            </a:r>
+          </a:p>
+          <a:p>
+            <a:pPr algn="ctr"/>
+            <a:r>
+              <a:rPr lang="en-US" sz="1000" dirty="0">
+                <a:highlight>
+                  <a:srgbClr val="FF00FF"/>
+                </a:highlight>
+              </a:rPr>
+              <a:t>Use past working/good (fixed?) </a:t>
+            </a:r>
+            <a:r>
+              <a:rPr lang="en-US" sz="1000" dirty="0" err="1">
+                <a:highlight>
+                  <a:srgbClr val="FF00FF"/>
+                </a:highlight>
+              </a:rPr>
+              <a:t>hold_dur</a:t>
+            </a:r>
+            <a:r>
+              <a:rPr lang="en-US" sz="1000" dirty="0">
+                <a:highlight>
+                  <a:srgbClr val="FF00FF"/>
+                </a:highlight>
+              </a:rPr>
+              <a:t> to inform future insider trade </a:t>
+            </a:r>
+            <a:r>
+              <a:rPr lang="en-US" sz="1000" dirty="0" err="1">
+                <a:highlight>
+                  <a:srgbClr val="FF00FF"/>
+                </a:highlight>
+              </a:rPr>
+              <a:t>hold_dur</a:t>
+            </a:r>
+            <a:r>
+              <a:rPr lang="en-US" sz="1000" dirty="0">
+                <a:highlight>
+                  <a:srgbClr val="FF00FF"/>
+                </a:highlight>
+              </a:rPr>
+              <a:t>?</a:t>
+            </a:r>
+          </a:p>
+          <a:p>
+            <a:pPr algn="ctr"/>
+            <a:endParaRPr lang="en-US" sz="1000" dirty="0">
+              <a:highlight>
+                <a:srgbClr val="FF00FF"/>
+              </a:highlight>
+            </a:endParaRPr>
+          </a:p>
+          <a:p>
+            <a:pPr algn="ctr"/>
+            <a:r>
+              <a:rPr lang="en-US" sz="1000" dirty="0">
+                <a:highlight>
+                  <a:srgbClr val="FF00FF"/>
+                </a:highlight>
+              </a:rPr>
+              <a:t>How to store this data if dynamic </a:t>
+            </a:r>
+            <a:r>
+              <a:rPr lang="en-US" sz="1000" dirty="0" err="1">
+                <a:highlight>
+                  <a:srgbClr val="FF00FF"/>
+                </a:highlight>
+              </a:rPr>
+              <a:t>hold_dur</a:t>
+            </a:r>
+            <a:r>
+              <a:rPr lang="en-US" sz="1000" dirty="0">
+                <a:highlight>
+                  <a:srgbClr val="FF00FF"/>
+                </a:highlight>
+              </a:rPr>
+              <a:t>?</a:t>
+            </a:r>
+          </a:p>
+          <a:p>
+            <a:pPr algn="ctr"/>
+            <a:r>
+              <a:rPr lang="en-US" sz="1000" dirty="0">
+                <a:highlight>
+                  <a:srgbClr val="FF00FF"/>
+                </a:highlight>
+              </a:rPr>
+              <a:t>set of for </a:t>
+            </a:r>
+            <a:r>
+              <a:rPr lang="en-US" sz="1000" dirty="0" err="1">
+                <a:highlight>
+                  <a:srgbClr val="FF00FF"/>
+                </a:highlight>
+              </a:rPr>
+              <a:t>ea</a:t>
+            </a:r>
+            <a:r>
+              <a:rPr lang="en-US" sz="1000" dirty="0">
+                <a:highlight>
+                  <a:srgbClr val="FF00FF"/>
+                </a:highlight>
+              </a:rPr>
+              <a:t> </a:t>
+            </a:r>
+            <a:r>
+              <a:rPr lang="en-US" sz="1000" dirty="0" err="1">
+                <a:highlight>
+                  <a:srgbClr val="FF00FF"/>
+                </a:highlight>
+              </a:rPr>
+              <a:t>prev</a:t>
+            </a:r>
+            <a:r>
+              <a:rPr lang="en-US" sz="1000" dirty="0">
+                <a:highlight>
+                  <a:srgbClr val="FF00FF"/>
+                </a:highlight>
+              </a:rPr>
+              <a:t> trade?: </a:t>
+            </a:r>
+          </a:p>
+          <a:p>
+            <a:pPr algn="ctr"/>
+            <a:r>
+              <a:rPr lang="en-US" sz="1000" dirty="0">
+                <a:highlight>
+                  <a:srgbClr val="FF00FF"/>
+                </a:highlight>
+              </a:rPr>
+              <a:t>is_pos_hold_dur_under70d? T/F</a:t>
+            </a:r>
+          </a:p>
+          <a:p>
+            <a:pPr algn="ctr"/>
+            <a:r>
+              <a:rPr lang="en-US" sz="1000" dirty="0" err="1">
+                <a:highlight>
+                  <a:srgbClr val="FF00FF"/>
+                </a:highlight>
+              </a:rPr>
+              <a:t>Hold_dur</a:t>
+            </a:r>
+            <a:r>
+              <a:rPr lang="en-US" sz="1000" dirty="0">
+                <a:highlight>
+                  <a:srgbClr val="FF00FF"/>
+                </a:highlight>
+              </a:rPr>
+              <a:t> return curve r vs x</a:t>
+            </a:r>
+          </a:p>
+          <a:p>
+            <a:pPr algn="ctr"/>
+            <a:r>
+              <a:rPr lang="en-US" sz="1000" dirty="0">
+                <a:highlight>
+                  <a:srgbClr val="FF00FF"/>
+                </a:highlight>
+              </a:rPr>
+              <a:t>Best </a:t>
+            </a:r>
+            <a:r>
+              <a:rPr lang="en-US" sz="1000" dirty="0" err="1">
+                <a:highlight>
+                  <a:srgbClr val="FF00FF"/>
+                </a:highlight>
+              </a:rPr>
+              <a:t>hold_dur</a:t>
+            </a:r>
+            <a:r>
+              <a:rPr lang="en-US" sz="1000" dirty="0">
+                <a:highlight>
+                  <a:srgbClr val="FF00FF"/>
+                </a:highlight>
+              </a:rPr>
+              <a:t> x</a:t>
+            </a:r>
+          </a:p>
+          <a:p>
+            <a:pPr algn="ctr"/>
+            <a:endParaRPr lang="en-US" sz="1000" dirty="0">
+              <a:highlight>
+                <a:srgbClr val="FF00FF"/>
+              </a:highlight>
+            </a:endParaRPr>
+          </a:p>
+        </p:txBody>
+      </p:sp>
+      <p:sp>
+        <p:nvSpPr>
+          <p:cNvPr id="9" name="Rectangle 8">
+            <a:extLst>
+              <a:ext uri="{FF2B5EF4-FFF2-40B4-BE49-F238E27FC236}">
+                <a16:creationId xmlns:a16="http://schemas.microsoft.com/office/drawing/2014/main" id="{A6525306-3D7F-8780-4782-5B6033803EBE}"/>
+              </a:ext>
+            </a:extLst>
+          </p:cNvPr>
+          <p:cNvSpPr/>
+          <p:nvPr/>
+        </p:nvSpPr>
+        <p:spPr>
+          <a:xfrm>
+            <a:off x="6005035" y="4391025"/>
+            <a:ext cx="2602962" cy="2234584"/>
+          </a:xfrm>
+          <a:prstGeom prst="rect">
+            <a:avLst/>
+          </a:prstGeom>
+        </p:spPr>
+        <p:style>
+          <a:lnRef idx="2">
+            <a:schemeClr val="accent1">
+              <a:shade val="15000"/>
+            </a:schemeClr>
+          </a:lnRef>
+          <a:fillRef idx="1">
+            <a:schemeClr val="accent1"/>
+          </a:fillRef>
+          <a:effectRef idx="0">
+            <a:schemeClr val="accent1"/>
+          </a:effectRef>
+          <a:fontRef idx="minor">
+            <a:schemeClr val="lt1"/>
+          </a:fontRef>
+        </p:style>
+        <p:txBody>
+          <a:bodyPr rtlCol="0" anchor="ctr"/>
+          <a:lstStyle/>
+          <a:p>
+            <a:pPr algn="ctr"/>
+            <a:r>
+              <a:rPr lang="en-US" sz="1000" dirty="0">
+                <a:highlight>
+                  <a:srgbClr val="FF00FF"/>
+                </a:highlight>
+              </a:rPr>
+              <a:t>Pred 1d hold   VS   any+ in 10d hold? 30d?45?70?</a:t>
+            </a:r>
+          </a:p>
+          <a:p>
+            <a:pPr algn="ctr"/>
+            <a:endParaRPr lang="en-US" sz="1000" dirty="0">
+              <a:highlight>
+                <a:srgbClr val="FF00FF"/>
+              </a:highlight>
+            </a:endParaRPr>
+          </a:p>
+          <a:p>
+            <a:pPr algn="ctr"/>
+            <a:r>
+              <a:rPr lang="en-US" sz="1000" dirty="0">
+                <a:highlight>
+                  <a:srgbClr val="FF00FF"/>
+                </a:highlight>
+              </a:rPr>
+              <a:t>Binary AND regression pred.</a:t>
+            </a:r>
+          </a:p>
+          <a:p>
+            <a:pPr algn="ctr"/>
+            <a:endParaRPr lang="en-US" sz="1000" dirty="0">
+              <a:highlight>
+                <a:srgbClr val="FF00FF"/>
+              </a:highlight>
+            </a:endParaRPr>
+          </a:p>
+          <a:p>
+            <a:pPr algn="ctr"/>
+            <a:r>
+              <a:rPr lang="en-US" sz="1000" dirty="0">
+                <a:highlight>
+                  <a:srgbClr val="FF00FF"/>
+                </a:highlight>
+              </a:rPr>
+              <a:t>(obvs both+ daily update Montecarlo)</a:t>
+            </a:r>
           </a:p>
         </p:txBody>
       </p:sp>
@@ -10607,7 +12152,7 @@
 </p:sld>
 </file>
 
-<file path=ppt/slides/slide3.xml><?xml version="1.0" encoding="utf-8"?>
+<file path=ppt/slides/slide4.xml><?xml version="1.0" encoding="utf-8"?>
 <p:sld xmlns:a="http://schemas.openxmlformats.org/drawingml/2006/main" xmlns:r="http://schemas.openxmlformats.org/officeDocument/2006/relationships" xmlns:p="http://schemas.openxmlformats.org/presentationml/2006/main">
   <p:cSld>
     <p:spTree>
@@ -10801,7 +12346,7 @@
 </p:sld>
 </file>
 
-<file path=ppt/slides/slide4.xml><?xml version="1.0" encoding="utf-8"?>
+<file path=ppt/slides/slide5.xml><?xml version="1.0" encoding="utf-8"?>
 <p:sld xmlns:a="http://schemas.openxmlformats.org/drawingml/2006/main" xmlns:r="http://schemas.openxmlformats.org/officeDocument/2006/relationships" xmlns:p="http://schemas.openxmlformats.org/presentationml/2006/main">
   <p:cSld>
     <p:spTree>
@@ -11096,16 +12641,16 @@
         </p:blipFill>
         <p:spPr>
           <a:xfrm>
-            <a:off x="10222763" y="1735239"/>
-            <a:ext cx="1923362" cy="2317898"/>
+            <a:off x="10163493" y="1735239"/>
+            <a:ext cx="1982632" cy="2389326"/>
           </a:xfrm>
           <a:prstGeom prst="rect">
             <a:avLst/>
           </a:prstGeom>
         </p:spPr>
       </p:pic>
-      <mc:AlternateContent xmlns:mc="http://schemas.openxmlformats.org/markup-compatibility/2006">
-        <mc:Choice xmlns:p14="http://schemas.microsoft.com/office/powerpoint/2010/main" Requires="p14">
+      <mc:AlternateContent xmlns:mc="http://schemas.openxmlformats.org/markup-compatibility/2006" xmlns:p14="http://schemas.microsoft.com/office/powerpoint/2010/main">
+        <mc:Choice Requires="p14">
           <p:contentPart p14:bwMode="auto" r:id="rId8">
             <p14:nvContentPartPr>
               <p14:cNvPr id="18" name="Ink 17">
@@ -11124,7 +12669,7 @@
             </p14:xfrm>
           </p:contentPart>
         </mc:Choice>
-        <mc:Fallback>
+        <mc:Fallback xmlns="">
           <p:pic>
             <p:nvPicPr>
               <p:cNvPr id="18" name="Ink 17">
@@ -11155,8 +12700,8 @@
           </p:pic>
         </mc:Fallback>
       </mc:AlternateContent>
-      <mc:AlternateContent xmlns:mc="http://schemas.openxmlformats.org/markup-compatibility/2006">
-        <mc:Choice xmlns:p14="http://schemas.microsoft.com/office/powerpoint/2010/main" Requires="p14">
+      <mc:AlternateContent xmlns:mc="http://schemas.openxmlformats.org/markup-compatibility/2006" xmlns:p14="http://schemas.microsoft.com/office/powerpoint/2010/main">
+        <mc:Choice Requires="p14">
           <p:contentPart p14:bwMode="auto" r:id="rId10">
             <p14:nvContentPartPr>
               <p14:cNvPr id="22" name="Ink 21">
@@ -11175,7 +12720,7 @@
             </p14:xfrm>
           </p:contentPart>
         </mc:Choice>
-        <mc:Fallback>
+        <mc:Fallback xmlns="">
           <p:pic>
             <p:nvPicPr>
               <p:cNvPr id="22" name="Ink 21">
@@ -11206,8 +12751,8 @@
           </p:pic>
         </mc:Fallback>
       </mc:AlternateContent>
-      <mc:AlternateContent xmlns:mc="http://schemas.openxmlformats.org/markup-compatibility/2006">
-        <mc:Choice xmlns:p14="http://schemas.microsoft.com/office/powerpoint/2010/main" Requires="p14">
+      <mc:AlternateContent xmlns:mc="http://schemas.openxmlformats.org/markup-compatibility/2006" xmlns:p14="http://schemas.microsoft.com/office/powerpoint/2010/main">
+        <mc:Choice Requires="p14">
           <p:contentPart p14:bwMode="auto" r:id="rId12">
             <p14:nvContentPartPr>
               <p14:cNvPr id="23" name="Ink 22">
@@ -11226,7 +12771,7 @@
             </p14:xfrm>
           </p:contentPart>
         </mc:Choice>
-        <mc:Fallback>
+        <mc:Fallback xmlns="">
           <p:pic>
             <p:nvPicPr>
               <p:cNvPr id="23" name="Ink 22">
@@ -11257,8 +12802,8 @@
           </p:pic>
         </mc:Fallback>
       </mc:AlternateContent>
-      <mc:AlternateContent xmlns:mc="http://schemas.openxmlformats.org/markup-compatibility/2006">
-        <mc:Choice xmlns:p14="http://schemas.microsoft.com/office/powerpoint/2010/main" Requires="p14">
+      <mc:AlternateContent xmlns:mc="http://schemas.openxmlformats.org/markup-compatibility/2006" xmlns:p14="http://schemas.microsoft.com/office/powerpoint/2010/main">
+        <mc:Choice Requires="p14">
           <p:contentPart p14:bwMode="auto" r:id="rId14">
             <p14:nvContentPartPr>
               <p14:cNvPr id="24" name="Ink 23">
@@ -11277,7 +12822,7 @@
             </p14:xfrm>
           </p:contentPart>
         </mc:Choice>
-        <mc:Fallback>
+        <mc:Fallback xmlns="">
           <p:pic>
             <p:nvPicPr>
               <p:cNvPr id="24" name="Ink 23">
@@ -11308,8 +12853,8 @@
           </p:pic>
         </mc:Fallback>
       </mc:AlternateContent>
-      <mc:AlternateContent xmlns:mc="http://schemas.openxmlformats.org/markup-compatibility/2006">
-        <mc:Choice xmlns:p14="http://schemas.microsoft.com/office/powerpoint/2010/main" Requires="p14">
+      <mc:AlternateContent xmlns:mc="http://schemas.openxmlformats.org/markup-compatibility/2006" xmlns:p14="http://schemas.microsoft.com/office/powerpoint/2010/main">
+        <mc:Choice Requires="p14">
           <p:contentPart p14:bwMode="auto" r:id="rId16">
             <p14:nvContentPartPr>
               <p14:cNvPr id="28" name="Ink 27">
@@ -11328,7 +12873,7 @@
             </p14:xfrm>
           </p:contentPart>
         </mc:Choice>
-        <mc:Fallback>
+        <mc:Fallback xmlns="">
           <p:pic>
             <p:nvPicPr>
               <p:cNvPr id="28" name="Ink 27">
@@ -11359,8 +12904,8 @@
           </p:pic>
         </mc:Fallback>
       </mc:AlternateContent>
-      <mc:AlternateContent xmlns:mc="http://schemas.openxmlformats.org/markup-compatibility/2006">
-        <mc:Choice xmlns:p14="http://schemas.microsoft.com/office/powerpoint/2010/main" Requires="p14">
+      <mc:AlternateContent xmlns:mc="http://schemas.openxmlformats.org/markup-compatibility/2006" xmlns:p14="http://schemas.microsoft.com/office/powerpoint/2010/main">
+        <mc:Choice Requires="p14">
           <p:contentPart p14:bwMode="auto" r:id="rId18">
             <p14:nvContentPartPr>
               <p14:cNvPr id="30" name="Ink 29">
@@ -11379,7 +12924,7 @@
             </p14:xfrm>
           </p:contentPart>
         </mc:Choice>
-        <mc:Fallback>
+        <mc:Fallback xmlns="">
           <p:pic>
             <p:nvPicPr>
               <p:cNvPr id="30" name="Ink 29">
@@ -11410,8 +12955,8 @@
           </p:pic>
         </mc:Fallback>
       </mc:AlternateContent>
-      <mc:AlternateContent xmlns:mc="http://schemas.openxmlformats.org/markup-compatibility/2006">
-        <mc:Choice xmlns:p14="http://schemas.microsoft.com/office/powerpoint/2010/main" Requires="p14">
+      <mc:AlternateContent xmlns:mc="http://schemas.openxmlformats.org/markup-compatibility/2006" xmlns:p14="http://schemas.microsoft.com/office/powerpoint/2010/main">
+        <mc:Choice Requires="p14">
           <p:contentPart p14:bwMode="auto" r:id="rId20">
             <p14:nvContentPartPr>
               <p14:cNvPr id="31" name="Ink 30">
@@ -11430,7 +12975,7 @@
             </p14:xfrm>
           </p:contentPart>
         </mc:Choice>
-        <mc:Fallback>
+        <mc:Fallback xmlns="">
           <p:pic>
             <p:nvPicPr>
               <p:cNvPr id="31" name="Ink 30">
@@ -11461,8 +13006,8 @@
           </p:pic>
         </mc:Fallback>
       </mc:AlternateContent>
-      <mc:AlternateContent xmlns:mc="http://schemas.openxmlformats.org/markup-compatibility/2006">
-        <mc:Choice xmlns:p14="http://schemas.microsoft.com/office/powerpoint/2010/main" Requires="p14">
+      <mc:AlternateContent xmlns:mc="http://schemas.openxmlformats.org/markup-compatibility/2006" xmlns:p14="http://schemas.microsoft.com/office/powerpoint/2010/main">
+        <mc:Choice Requires="p14">
           <p:contentPart p14:bwMode="auto" r:id="rId22">
             <p14:nvContentPartPr>
               <p14:cNvPr id="32" name="Ink 31">
@@ -11481,7 +13026,7 @@
             </p14:xfrm>
           </p:contentPart>
         </mc:Choice>
-        <mc:Fallback>
+        <mc:Fallback xmlns="">
           <p:pic>
             <p:nvPicPr>
               <p:cNvPr id="32" name="Ink 31">
@@ -11512,8 +13057,8 @@
           </p:pic>
         </mc:Fallback>
       </mc:AlternateContent>
-      <mc:AlternateContent xmlns:mc="http://schemas.openxmlformats.org/markup-compatibility/2006">
-        <mc:Choice xmlns:p14="http://schemas.microsoft.com/office/powerpoint/2010/main" Requires="p14">
+      <mc:AlternateContent xmlns:mc="http://schemas.openxmlformats.org/markup-compatibility/2006" xmlns:p14="http://schemas.microsoft.com/office/powerpoint/2010/main">
+        <mc:Choice Requires="p14">
           <p:contentPart p14:bwMode="auto" r:id="rId24">
             <p14:nvContentPartPr>
               <p14:cNvPr id="33" name="Ink 32">
@@ -11532,7 +13077,7 @@
             </p14:xfrm>
           </p:contentPart>
         </mc:Choice>
-        <mc:Fallback>
+        <mc:Fallback xmlns="">
           <p:pic>
             <p:nvPicPr>
               <p:cNvPr id="33" name="Ink 32">
@@ -11583,8 +13128,8 @@
             <a:chExt cx="4091400" cy="1150481"/>
           </a:xfrm>
         </p:grpSpPr>
-        <mc:AlternateContent xmlns:mc="http://schemas.openxmlformats.org/markup-compatibility/2006">
-          <mc:Choice xmlns:p14="http://schemas.microsoft.com/office/powerpoint/2010/main" Requires="p14">
+        <mc:AlternateContent xmlns:mc="http://schemas.openxmlformats.org/markup-compatibility/2006" xmlns:p14="http://schemas.microsoft.com/office/powerpoint/2010/main">
+          <mc:Choice Requires="p14">
             <p:contentPart p14:bwMode="auto" r:id="rId26">
               <p14:nvContentPartPr>
                 <p14:cNvPr id="25" name="Ink 24">
@@ -11603,7 +13148,7 @@
               </p14:xfrm>
             </p:contentPart>
           </mc:Choice>
-          <mc:Fallback>
+          <mc:Fallback xmlns="">
             <p:pic>
               <p:nvPicPr>
                 <p:cNvPr id="25" name="Ink 24">
@@ -11634,8 +13179,8 @@
             </p:pic>
           </mc:Fallback>
         </mc:AlternateContent>
-        <mc:AlternateContent xmlns:mc="http://schemas.openxmlformats.org/markup-compatibility/2006">
-          <mc:Choice xmlns:p14="http://schemas.microsoft.com/office/powerpoint/2010/main" Requires="p14">
+        <mc:AlternateContent xmlns:mc="http://schemas.openxmlformats.org/markup-compatibility/2006" xmlns:p14="http://schemas.microsoft.com/office/powerpoint/2010/main">
+          <mc:Choice Requires="p14">
             <p:contentPart p14:bwMode="auto" r:id="rId28">
               <p14:nvContentPartPr>
                 <p14:cNvPr id="19" name="Ink 18">
@@ -11654,7 +13199,7 @@
               </p14:xfrm>
             </p:contentPart>
           </mc:Choice>
-          <mc:Fallback>
+          <mc:Fallback xmlns="">
             <p:pic>
               <p:nvPicPr>
                 <p:cNvPr id="19" name="Ink 18">
@@ -11685,8 +13230,8 @@
             </p:pic>
           </mc:Fallback>
         </mc:AlternateContent>
-        <mc:AlternateContent xmlns:mc="http://schemas.openxmlformats.org/markup-compatibility/2006">
-          <mc:Choice xmlns:p14="http://schemas.microsoft.com/office/powerpoint/2010/main" Requires="p14">
+        <mc:AlternateContent xmlns:mc="http://schemas.openxmlformats.org/markup-compatibility/2006" xmlns:p14="http://schemas.microsoft.com/office/powerpoint/2010/main">
+          <mc:Choice Requires="p14">
             <p:contentPart p14:bwMode="auto" r:id="rId30">
               <p14:nvContentPartPr>
                 <p14:cNvPr id="20" name="Ink 19">
@@ -11705,7 +13250,7 @@
               </p14:xfrm>
             </p:contentPart>
           </mc:Choice>
-          <mc:Fallback>
+          <mc:Fallback xmlns="">
             <p:pic>
               <p:nvPicPr>
                 <p:cNvPr id="20" name="Ink 19">
@@ -11736,8 +13281,8 @@
             </p:pic>
           </mc:Fallback>
         </mc:AlternateContent>
-        <mc:AlternateContent xmlns:mc="http://schemas.openxmlformats.org/markup-compatibility/2006">
-          <mc:Choice xmlns:p14="http://schemas.microsoft.com/office/powerpoint/2010/main" Requires="p14">
+        <mc:AlternateContent xmlns:mc="http://schemas.openxmlformats.org/markup-compatibility/2006" xmlns:p14="http://schemas.microsoft.com/office/powerpoint/2010/main">
+          <mc:Choice Requires="p14">
             <p:contentPart p14:bwMode="auto" r:id="rId31">
               <p14:nvContentPartPr>
                 <p14:cNvPr id="26" name="Ink 25">
@@ -11756,7 +13301,7 @@
               </p14:xfrm>
             </p:contentPart>
           </mc:Choice>
-          <mc:Fallback>
+          <mc:Fallback xmlns="">
             <p:pic>
               <p:nvPicPr>
                 <p:cNvPr id="26" name="Ink 25">
@@ -11787,8 +13332,8 @@
             </p:pic>
           </mc:Fallback>
         </mc:AlternateContent>
-        <mc:AlternateContent xmlns:mc="http://schemas.openxmlformats.org/markup-compatibility/2006">
-          <mc:Choice xmlns:p14="http://schemas.microsoft.com/office/powerpoint/2010/main" Requires="p14">
+        <mc:AlternateContent xmlns:mc="http://schemas.openxmlformats.org/markup-compatibility/2006" xmlns:p14="http://schemas.microsoft.com/office/powerpoint/2010/main">
+          <mc:Choice Requires="p14">
             <p:contentPart p14:bwMode="auto" r:id="rId33">
               <p14:nvContentPartPr>
                 <p14:cNvPr id="34" name="Ink 33">
@@ -11807,7 +13352,7 @@
               </p14:xfrm>
             </p:contentPart>
           </mc:Choice>
-          <mc:Fallback>
+          <mc:Fallback xmlns="">
             <p:pic>
               <p:nvPicPr>
                 <p:cNvPr id="34" name="Ink 33">
@@ -11887,7 +13432,7 @@
 </p:sld>
 </file>
 
-<file path=ppt/slides/slide5.xml><?xml version="1.0" encoding="utf-8"?>
+<file path=ppt/slides/slide6.xml><?xml version="1.0" encoding="utf-8"?>
 <p:sld xmlns:a="http://schemas.openxmlformats.org/drawingml/2006/main" xmlns:r="http://schemas.openxmlformats.org/officeDocument/2006/relationships" xmlns:p="http://schemas.openxmlformats.org/presentationml/2006/main">
   <p:cSld>
     <p:spTree>
@@ -12140,7 +13685,7 @@
         </p:blipFill>
         <p:spPr>
           <a:xfrm>
-            <a:off x="5056162" y="1343789"/>
+            <a:off x="6020056" y="1343788"/>
             <a:ext cx="5326151" cy="5326151"/>
           </a:xfrm>
           <a:prstGeom prst="rect">
@@ -12164,7 +13709,7 @@
         </p:nvSpPr>
         <p:spPr>
           <a:xfrm>
-            <a:off x="5998722" y="4006864"/>
+            <a:off x="7059894" y="3982500"/>
             <a:ext cx="4686484" cy="4351338"/>
           </a:xfrm>
           <a:prstGeom prst="rect">
@@ -12372,8 +13917,8 @@
           </a:p>
         </p:txBody>
       </p:sp>
-      <mc:AlternateContent xmlns:mc="http://schemas.openxmlformats.org/markup-compatibility/2006">
-        <mc:Choice xmlns:p14="http://schemas.microsoft.com/office/powerpoint/2010/main" Requires="p14">
+      <mc:AlternateContent xmlns:mc="http://schemas.openxmlformats.org/markup-compatibility/2006" xmlns:p14="http://schemas.microsoft.com/office/powerpoint/2010/main">
+        <mc:Choice Requires="p14">
           <p:contentPart p14:bwMode="auto" r:id="rId7">
             <p14:nvContentPartPr>
               <p14:cNvPr id="15" name="Ink 14">
@@ -12392,7 +13937,7 @@
             </p14:xfrm>
           </p:contentPart>
         </mc:Choice>
-        <mc:Fallback>
+        <mc:Fallback xmlns="">
           <p:pic>
             <p:nvPicPr>
               <p:cNvPr id="15" name="Ink 14">
@@ -12423,8 +13968,8 @@
           </p:pic>
         </mc:Fallback>
       </mc:AlternateContent>
-      <mc:AlternateContent xmlns:mc="http://schemas.openxmlformats.org/markup-compatibility/2006">
-        <mc:Choice xmlns:p14="http://schemas.microsoft.com/office/powerpoint/2010/main" Requires="p14">
+      <mc:AlternateContent xmlns:mc="http://schemas.openxmlformats.org/markup-compatibility/2006" xmlns:p14="http://schemas.microsoft.com/office/powerpoint/2010/main">
+        <mc:Choice Requires="p14">
           <p:contentPart p14:bwMode="auto" r:id="rId9">
             <p14:nvContentPartPr>
               <p14:cNvPr id="16" name="Ink 15">
@@ -12443,7 +13988,7 @@
             </p14:xfrm>
           </p:contentPart>
         </mc:Choice>
-        <mc:Fallback>
+        <mc:Fallback xmlns="">
           <p:pic>
             <p:nvPicPr>
               <p:cNvPr id="16" name="Ink 15">
@@ -12474,8 +14019,8 @@
           </p:pic>
         </mc:Fallback>
       </mc:AlternateContent>
-      <mc:AlternateContent xmlns:mc="http://schemas.openxmlformats.org/markup-compatibility/2006">
-        <mc:Choice xmlns:p14="http://schemas.microsoft.com/office/powerpoint/2010/main" Requires="p14">
+      <mc:AlternateContent xmlns:mc="http://schemas.openxmlformats.org/markup-compatibility/2006" xmlns:p14="http://schemas.microsoft.com/office/powerpoint/2010/main">
+        <mc:Choice Requires="p14">
           <p:contentPart p14:bwMode="auto" r:id="rId11">
             <p14:nvContentPartPr>
               <p14:cNvPr id="17" name="Ink 16">
@@ -12494,7 +14039,7 @@
             </p14:xfrm>
           </p:contentPart>
         </mc:Choice>
-        <mc:Fallback>
+        <mc:Fallback xmlns="">
           <p:pic>
             <p:nvPicPr>
               <p:cNvPr id="17" name="Ink 16">
@@ -12540,7 +14085,7 @@
               <p14:nvPr/>
             </p14:nvContentPartPr>
             <p14:xfrm>
-              <a:off x="5149723" y="3303627"/>
+              <a:off x="6096000" y="3280680"/>
               <a:ext cx="280440" cy="148320"/>
             </p14:xfrm>
           </p:contentPart>
@@ -12566,7 +14111,7 @@
             </p:blipFill>
             <p:spPr>
               <a:xfrm>
-                <a:off x="5143603" y="3297507"/>
+                <a:off x="6089880" y="3274560"/>
                 <a:ext cx="292680" cy="160560"/>
               </a:xfrm>
               <a:prstGeom prst="rect">
@@ -12589,7 +14134,7 @@
 </p:sld>
 </file>
 
-<file path=ppt/slides/slide6.xml><?xml version="1.0" encoding="utf-8"?>
+<file path=ppt/slides/slide7.xml><?xml version="1.0" encoding="utf-8"?>
 <p:sld xmlns:a="http://schemas.openxmlformats.org/drawingml/2006/main" xmlns:r="http://schemas.openxmlformats.org/officeDocument/2006/relationships" xmlns:p="http://schemas.openxmlformats.org/presentationml/2006/main">
   <p:cSld>
     <p:spTree>
@@ -12851,7 +14396,7 @@
         </p:nvSpPr>
         <p:spPr>
           <a:xfrm>
-            <a:off x="6561915" y="4501578"/>
+            <a:off x="6993509" y="4558388"/>
             <a:ext cx="4842317" cy="4351338"/>
           </a:xfrm>
           <a:prstGeom prst="rect">
@@ -13042,8 +14587,8 @@
           </a:p>
         </p:txBody>
       </p:sp>
-      <mc:AlternateContent xmlns:mc="http://schemas.openxmlformats.org/markup-compatibility/2006">
-        <mc:Choice xmlns:p14="http://schemas.microsoft.com/office/powerpoint/2010/main" Requires="p14">
+      <mc:AlternateContent xmlns:mc="http://schemas.openxmlformats.org/markup-compatibility/2006" xmlns:p14="http://schemas.microsoft.com/office/powerpoint/2010/main">
+        <mc:Choice Requires="p14">
           <p:contentPart p14:bwMode="auto" r:id="rId7">
             <p14:nvContentPartPr>
               <p14:cNvPr id="16" name="Ink 15">
@@ -13062,7 +14607,7 @@
             </p14:xfrm>
           </p:contentPart>
         </mc:Choice>
-        <mc:Fallback>
+        <mc:Fallback xmlns="">
           <p:pic>
             <p:nvPicPr>
               <p:cNvPr id="16" name="Ink 15">
@@ -13093,8 +14638,8 @@
           </p:pic>
         </mc:Fallback>
       </mc:AlternateContent>
-      <mc:AlternateContent xmlns:mc="http://schemas.openxmlformats.org/markup-compatibility/2006">
-        <mc:Choice xmlns:p14="http://schemas.microsoft.com/office/powerpoint/2010/main" Requires="p14">
+      <mc:AlternateContent xmlns:mc="http://schemas.openxmlformats.org/markup-compatibility/2006" xmlns:p14="http://schemas.microsoft.com/office/powerpoint/2010/main">
+        <mc:Choice Requires="p14">
           <p:contentPart p14:bwMode="auto" r:id="rId9">
             <p14:nvContentPartPr>
               <p14:cNvPr id="19" name="Ink 18">
@@ -13113,7 +14658,7 @@
             </p14:xfrm>
           </p:contentPart>
         </mc:Choice>
-        <mc:Fallback>
+        <mc:Fallback xmlns="">
           <p:pic>
             <p:nvPicPr>
               <p:cNvPr id="19" name="Ink 18">
@@ -13144,8 +14689,8 @@
           </p:pic>
         </mc:Fallback>
       </mc:AlternateContent>
-      <mc:AlternateContent xmlns:mc="http://schemas.openxmlformats.org/markup-compatibility/2006">
-        <mc:Choice xmlns:p14="http://schemas.microsoft.com/office/powerpoint/2010/main" Requires="p14">
+      <mc:AlternateContent xmlns:mc="http://schemas.openxmlformats.org/markup-compatibility/2006" xmlns:p14="http://schemas.microsoft.com/office/powerpoint/2010/main">
+        <mc:Choice Requires="p14">
           <p:contentPart p14:bwMode="auto" r:id="rId11">
             <p14:nvContentPartPr>
               <p14:cNvPr id="20" name="Ink 19">
@@ -13164,7 +14709,7 @@
             </p14:xfrm>
           </p:contentPart>
         </mc:Choice>
-        <mc:Fallback>
+        <mc:Fallback xmlns="">
           <p:pic>
             <p:nvPicPr>
               <p:cNvPr id="20" name="Ink 19">
@@ -13215,8 +14760,8 @@
             <a:chExt cx="360" cy="162000"/>
           </a:xfrm>
         </p:grpSpPr>
-        <mc:AlternateContent xmlns:mc="http://schemas.openxmlformats.org/markup-compatibility/2006">
-          <mc:Choice xmlns:p14="http://schemas.microsoft.com/office/powerpoint/2010/main" Requires="p14">
+        <mc:AlternateContent xmlns:mc="http://schemas.openxmlformats.org/markup-compatibility/2006" xmlns:p14="http://schemas.microsoft.com/office/powerpoint/2010/main">
+          <mc:Choice Requires="p14">
             <p:contentPart p14:bwMode="auto" r:id="rId13">
               <p14:nvContentPartPr>
                 <p14:cNvPr id="21" name="Ink 20">
@@ -13235,7 +14780,7 @@
               </p14:xfrm>
             </p:contentPart>
           </mc:Choice>
-          <mc:Fallback>
+          <mc:Fallback xmlns="">
             <p:pic>
               <p:nvPicPr>
                 <p:cNvPr id="21" name="Ink 20">
@@ -13266,8 +14811,8 @@
             </p:pic>
           </mc:Fallback>
         </mc:AlternateContent>
-        <mc:AlternateContent xmlns:mc="http://schemas.openxmlformats.org/markup-compatibility/2006">
-          <mc:Choice xmlns:p14="http://schemas.microsoft.com/office/powerpoint/2010/main" Requires="p14">
+        <mc:AlternateContent xmlns:mc="http://schemas.openxmlformats.org/markup-compatibility/2006" xmlns:p14="http://schemas.microsoft.com/office/powerpoint/2010/main">
+          <mc:Choice Requires="p14">
             <p:contentPart p14:bwMode="auto" r:id="rId15">
               <p14:nvContentPartPr>
                 <p14:cNvPr id="22" name="Ink 21">
@@ -13286,7 +14831,7 @@
               </p14:xfrm>
             </p:contentPart>
           </mc:Choice>
-          <mc:Fallback>
+          <mc:Fallback xmlns="">
             <p:pic>
               <p:nvPicPr>
                 <p:cNvPr id="22" name="Ink 21">
@@ -13318,8 +14863,8 @@
           </mc:Fallback>
         </mc:AlternateContent>
       </p:grpSp>
-      <mc:AlternateContent xmlns:mc="http://schemas.openxmlformats.org/markup-compatibility/2006">
-        <mc:Choice xmlns:p14="http://schemas.microsoft.com/office/powerpoint/2010/main" Requires="p14">
+      <mc:AlternateContent xmlns:mc="http://schemas.openxmlformats.org/markup-compatibility/2006" xmlns:p14="http://schemas.microsoft.com/office/powerpoint/2010/main">
+        <mc:Choice Requires="p14">
           <p:contentPart p14:bwMode="auto" r:id="rId17">
             <p14:nvContentPartPr>
               <p14:cNvPr id="23" name="Ink 22">
@@ -13338,7 +14883,7 @@
             </p14:xfrm>
           </p:contentPart>
         </mc:Choice>
-        <mc:Fallback>
+        <mc:Fallback xmlns="">
           <p:pic>
             <p:nvPicPr>
               <p:cNvPr id="23" name="Ink 22">
@@ -13369,8 +14914,8 @@
           </p:pic>
         </mc:Fallback>
       </mc:AlternateContent>
-      <mc:AlternateContent xmlns:mc="http://schemas.openxmlformats.org/markup-compatibility/2006">
-        <mc:Choice xmlns:p14="http://schemas.microsoft.com/office/powerpoint/2010/main" Requires="p14">
+      <mc:AlternateContent xmlns:mc="http://schemas.openxmlformats.org/markup-compatibility/2006" xmlns:p14="http://schemas.microsoft.com/office/powerpoint/2010/main">
+        <mc:Choice Requires="p14">
           <p:contentPart p14:bwMode="auto" r:id="rId19">
             <p14:nvContentPartPr>
               <p14:cNvPr id="24" name="Ink 23">
@@ -13389,7 +14934,7 @@
             </p14:xfrm>
           </p:contentPart>
         </mc:Choice>
-        <mc:Fallback>
+        <mc:Fallback xmlns="">
           <p:pic>
             <p:nvPicPr>
               <p:cNvPr id="24" name="Ink 23">
@@ -13420,8 +14965,8 @@
           </p:pic>
         </mc:Fallback>
       </mc:AlternateContent>
-      <mc:AlternateContent xmlns:mc="http://schemas.openxmlformats.org/markup-compatibility/2006">
-        <mc:Choice xmlns:p14="http://schemas.microsoft.com/office/powerpoint/2010/main" Requires="p14">
+      <mc:AlternateContent xmlns:mc="http://schemas.openxmlformats.org/markup-compatibility/2006" xmlns:p14="http://schemas.microsoft.com/office/powerpoint/2010/main">
+        <mc:Choice Requires="p14">
           <p:contentPart p14:bwMode="auto" r:id="rId21">
             <p14:nvContentPartPr>
               <p14:cNvPr id="25" name="Ink 24">
@@ -13440,7 +14985,7 @@
             </p14:xfrm>
           </p:contentPart>
         </mc:Choice>
-        <mc:Fallback>
+        <mc:Fallback xmlns="">
           <p:pic>
             <p:nvPicPr>
               <p:cNvPr id="25" name="Ink 24">
@@ -13471,8 +15016,8 @@
           </p:pic>
         </mc:Fallback>
       </mc:AlternateContent>
-      <mc:AlternateContent xmlns:mc="http://schemas.openxmlformats.org/markup-compatibility/2006">
-        <mc:Choice xmlns:p14="http://schemas.microsoft.com/office/powerpoint/2010/main" Requires="p14">
+      <mc:AlternateContent xmlns:mc="http://schemas.openxmlformats.org/markup-compatibility/2006" xmlns:p14="http://schemas.microsoft.com/office/powerpoint/2010/main">
+        <mc:Choice Requires="p14">
           <p:contentPart p14:bwMode="auto" r:id="rId23">
             <p14:nvContentPartPr>
               <p14:cNvPr id="26" name="Ink 25">
@@ -13491,7 +15036,7 @@
             </p14:xfrm>
           </p:contentPart>
         </mc:Choice>
-        <mc:Fallback>
+        <mc:Fallback xmlns="">
           <p:pic>
             <p:nvPicPr>
               <p:cNvPr id="26" name="Ink 25">
@@ -13522,8 +15067,8 @@
           </p:pic>
         </mc:Fallback>
       </mc:AlternateContent>
-      <mc:AlternateContent xmlns:mc="http://schemas.openxmlformats.org/markup-compatibility/2006">
-        <mc:Choice xmlns:p14="http://schemas.microsoft.com/office/powerpoint/2010/main" Requires="p14">
+      <mc:AlternateContent xmlns:mc="http://schemas.openxmlformats.org/markup-compatibility/2006" xmlns:p14="http://schemas.microsoft.com/office/powerpoint/2010/main">
+        <mc:Choice Requires="p14">
           <p:contentPart p14:bwMode="auto" r:id="rId25">
             <p14:nvContentPartPr>
               <p14:cNvPr id="27" name="Ink 26">
@@ -13542,7 +15087,7 @@
             </p14:xfrm>
           </p:contentPart>
         </mc:Choice>
-        <mc:Fallback>
+        <mc:Fallback xmlns="">
           <p:pic>
             <p:nvPicPr>
               <p:cNvPr id="27" name="Ink 26">
@@ -13573,8 +15118,8 @@
           </p:pic>
         </mc:Fallback>
       </mc:AlternateContent>
-      <mc:AlternateContent xmlns:mc="http://schemas.openxmlformats.org/markup-compatibility/2006">
-        <mc:Choice xmlns:p14="http://schemas.microsoft.com/office/powerpoint/2010/main" Requires="p14">
+      <mc:AlternateContent xmlns:mc="http://schemas.openxmlformats.org/markup-compatibility/2006" xmlns:p14="http://schemas.microsoft.com/office/powerpoint/2010/main">
+        <mc:Choice Requires="p14">
           <p:contentPart p14:bwMode="auto" r:id="rId27">
             <p14:nvContentPartPr>
               <p14:cNvPr id="28" name="Ink 27">
@@ -13593,7 +15138,7 @@
             </p14:xfrm>
           </p:contentPart>
         </mc:Choice>
-        <mc:Fallback>
+        <mc:Fallback xmlns="">
           <p:pic>
             <p:nvPicPr>
               <p:cNvPr id="28" name="Ink 27">
@@ -13624,8 +15169,8 @@
           </p:pic>
         </mc:Fallback>
       </mc:AlternateContent>
-      <mc:AlternateContent xmlns:mc="http://schemas.openxmlformats.org/markup-compatibility/2006">
-        <mc:Choice xmlns:p14="http://schemas.microsoft.com/office/powerpoint/2010/main" Requires="p14">
+      <mc:AlternateContent xmlns:mc="http://schemas.openxmlformats.org/markup-compatibility/2006" xmlns:p14="http://schemas.microsoft.com/office/powerpoint/2010/main">
+        <mc:Choice Requires="p14">
           <p:contentPart p14:bwMode="auto" r:id="rId29">
             <p14:nvContentPartPr>
               <p14:cNvPr id="29" name="Ink 28">
@@ -13644,7 +15189,7 @@
             </p14:xfrm>
           </p:contentPart>
         </mc:Choice>
-        <mc:Fallback>
+        <mc:Fallback xmlns="">
           <p:pic>
             <p:nvPicPr>
               <p:cNvPr id="29" name="Ink 28">
@@ -13675,8 +15220,8 @@
           </p:pic>
         </mc:Fallback>
       </mc:AlternateContent>
-      <mc:AlternateContent xmlns:mc="http://schemas.openxmlformats.org/markup-compatibility/2006">
-        <mc:Choice xmlns:p14="http://schemas.microsoft.com/office/powerpoint/2010/main" Requires="p14">
+      <mc:AlternateContent xmlns:mc="http://schemas.openxmlformats.org/markup-compatibility/2006" xmlns:p14="http://schemas.microsoft.com/office/powerpoint/2010/main">
+        <mc:Choice Requires="p14">
           <p:contentPart p14:bwMode="auto" r:id="rId31">
             <p14:nvContentPartPr>
               <p14:cNvPr id="30" name="Ink 29">
@@ -13695,7 +15240,7 @@
             </p14:xfrm>
           </p:contentPart>
         </mc:Choice>
-        <mc:Fallback>
+        <mc:Fallback xmlns="">
           <p:pic>
             <p:nvPicPr>
               <p:cNvPr id="30" name="Ink 29">
@@ -13726,8 +15271,8 @@
           </p:pic>
         </mc:Fallback>
       </mc:AlternateContent>
-      <mc:AlternateContent xmlns:mc="http://schemas.openxmlformats.org/markup-compatibility/2006">
-        <mc:Choice xmlns:p14="http://schemas.microsoft.com/office/powerpoint/2010/main" Requires="p14">
+      <mc:AlternateContent xmlns:mc="http://schemas.openxmlformats.org/markup-compatibility/2006" xmlns:p14="http://schemas.microsoft.com/office/powerpoint/2010/main">
+        <mc:Choice Requires="p14">
           <p:contentPart p14:bwMode="auto" r:id="rId33">
             <p14:nvContentPartPr>
               <p14:cNvPr id="31" name="Ink 30">
@@ -13746,7 +15291,7 @@
             </p14:xfrm>
           </p:contentPart>
         </mc:Choice>
-        <mc:Fallback>
+        <mc:Fallback xmlns="">
           <p:pic>
             <p:nvPicPr>
               <p:cNvPr id="31" name="Ink 30">
@@ -13777,8 +15322,8 @@
           </p:pic>
         </mc:Fallback>
       </mc:AlternateContent>
-      <mc:AlternateContent xmlns:mc="http://schemas.openxmlformats.org/markup-compatibility/2006">
-        <mc:Choice xmlns:p14="http://schemas.microsoft.com/office/powerpoint/2010/main" Requires="p14">
+      <mc:AlternateContent xmlns:mc="http://schemas.openxmlformats.org/markup-compatibility/2006" xmlns:p14="http://schemas.microsoft.com/office/powerpoint/2010/main">
+        <mc:Choice Requires="p14">
           <p:contentPart p14:bwMode="auto" r:id="rId35">
             <p14:nvContentPartPr>
               <p14:cNvPr id="32" name="Ink 31">
@@ -13797,7 +15342,7 @@
             </p14:xfrm>
           </p:contentPart>
         </mc:Choice>
-        <mc:Fallback>
+        <mc:Fallback xmlns="">
           <p:pic>
             <p:nvPicPr>
               <p:cNvPr id="32" name="Ink 31">
@@ -13828,8 +15373,8 @@
           </p:pic>
         </mc:Fallback>
       </mc:AlternateContent>
-      <mc:AlternateContent xmlns:mc="http://schemas.openxmlformats.org/markup-compatibility/2006">
-        <mc:Choice xmlns:p14="http://schemas.microsoft.com/office/powerpoint/2010/main" Requires="p14">
+      <mc:AlternateContent xmlns:mc="http://schemas.openxmlformats.org/markup-compatibility/2006" xmlns:p14="http://schemas.microsoft.com/office/powerpoint/2010/main">
+        <mc:Choice Requires="p14">
           <p:contentPart p14:bwMode="auto" r:id="rId37">
             <p14:nvContentPartPr>
               <p14:cNvPr id="33" name="Ink 32">
@@ -13848,7 +15393,7 @@
             </p14:xfrm>
           </p:contentPart>
         </mc:Choice>
-        <mc:Fallback>
+        <mc:Fallback xmlns="">
           <p:pic>
             <p:nvPicPr>
               <p:cNvPr id="33" name="Ink 32">
@@ -13879,8 +15424,8 @@
           </p:pic>
         </mc:Fallback>
       </mc:AlternateContent>
-      <mc:AlternateContent xmlns:mc="http://schemas.openxmlformats.org/markup-compatibility/2006">
-        <mc:Choice xmlns:p14="http://schemas.microsoft.com/office/powerpoint/2010/main" Requires="p14">
+      <mc:AlternateContent xmlns:mc="http://schemas.openxmlformats.org/markup-compatibility/2006" xmlns:p14="http://schemas.microsoft.com/office/powerpoint/2010/main">
+        <mc:Choice Requires="p14">
           <p:contentPart p14:bwMode="auto" r:id="rId39">
             <p14:nvContentPartPr>
               <p14:cNvPr id="36" name="Ink 35">
@@ -13899,7 +15444,7 @@
             </p14:xfrm>
           </p:contentPart>
         </mc:Choice>
-        <mc:Fallback>
+        <mc:Fallback xmlns="">
           <p:pic>
             <p:nvPicPr>
               <p:cNvPr id="36" name="Ink 35">
@@ -13930,8 +15475,8 @@
           </p:pic>
         </mc:Fallback>
       </mc:AlternateContent>
-      <mc:AlternateContent xmlns:mc="http://schemas.openxmlformats.org/markup-compatibility/2006">
-        <mc:Choice xmlns:p14="http://schemas.microsoft.com/office/powerpoint/2010/main" Requires="p14">
+      <mc:AlternateContent xmlns:mc="http://schemas.openxmlformats.org/markup-compatibility/2006" xmlns:p14="http://schemas.microsoft.com/office/powerpoint/2010/main">
+        <mc:Choice Requires="p14">
           <p:contentPart p14:bwMode="auto" r:id="rId41">
             <p14:nvContentPartPr>
               <p14:cNvPr id="37" name="Ink 36">
@@ -13950,7 +15495,7 @@
             </p14:xfrm>
           </p:contentPart>
         </mc:Choice>
-        <mc:Fallback>
+        <mc:Fallback xmlns="">
           <p:pic>
             <p:nvPicPr>
               <p:cNvPr id="37" name="Ink 36">
@@ -13981,8 +15526,8 @@
           </p:pic>
         </mc:Fallback>
       </mc:AlternateContent>
-      <mc:AlternateContent xmlns:mc="http://schemas.openxmlformats.org/markup-compatibility/2006">
-        <mc:Choice xmlns:p14="http://schemas.microsoft.com/office/powerpoint/2010/main" Requires="p14">
+      <mc:AlternateContent xmlns:mc="http://schemas.openxmlformats.org/markup-compatibility/2006" xmlns:p14="http://schemas.microsoft.com/office/powerpoint/2010/main">
+        <mc:Choice Requires="p14">
           <p:contentPart p14:bwMode="auto" r:id="rId42">
             <p14:nvContentPartPr>
               <p14:cNvPr id="38" name="Ink 37">
@@ -14001,7 +15546,7 @@
             </p14:xfrm>
           </p:contentPart>
         </mc:Choice>
-        <mc:Fallback>
+        <mc:Fallback xmlns="">
           <p:pic>
             <p:nvPicPr>
               <p:cNvPr id="38" name="Ink 37">
@@ -14032,8 +15577,8 @@
           </p:pic>
         </mc:Fallback>
       </mc:AlternateContent>
-      <mc:AlternateContent xmlns:mc="http://schemas.openxmlformats.org/markup-compatibility/2006">
-        <mc:Choice xmlns:p14="http://schemas.microsoft.com/office/powerpoint/2010/main" Requires="p14">
+      <mc:AlternateContent xmlns:mc="http://schemas.openxmlformats.org/markup-compatibility/2006" xmlns:p14="http://schemas.microsoft.com/office/powerpoint/2010/main">
+        <mc:Choice Requires="p14">
           <p:contentPart p14:bwMode="auto" r:id="rId43">
             <p14:nvContentPartPr>
               <p14:cNvPr id="39" name="Ink 38">
@@ -14052,7 +15597,7 @@
             </p14:xfrm>
           </p:contentPart>
         </mc:Choice>
-        <mc:Fallback>
+        <mc:Fallback xmlns="">
           <p:pic>
             <p:nvPicPr>
               <p:cNvPr id="39" name="Ink 38">
@@ -14083,8 +15628,8 @@
           </p:pic>
         </mc:Fallback>
       </mc:AlternateContent>
-      <mc:AlternateContent xmlns:mc="http://schemas.openxmlformats.org/markup-compatibility/2006">
-        <mc:Choice xmlns:p14="http://schemas.microsoft.com/office/powerpoint/2010/main" Requires="p14">
+      <mc:AlternateContent xmlns:mc="http://schemas.openxmlformats.org/markup-compatibility/2006" xmlns:p14="http://schemas.microsoft.com/office/powerpoint/2010/main">
+        <mc:Choice Requires="p14">
           <p:contentPart p14:bwMode="auto" r:id="rId45">
             <p14:nvContentPartPr>
               <p14:cNvPr id="40" name="Ink 39">
@@ -14103,7 +15648,7 @@
             </p14:xfrm>
           </p:contentPart>
         </mc:Choice>
-        <mc:Fallback>
+        <mc:Fallback xmlns="">
           <p:pic>
             <p:nvPicPr>
               <p:cNvPr id="40" name="Ink 39">
@@ -14134,8 +15679,8 @@
           </p:pic>
         </mc:Fallback>
       </mc:AlternateContent>
-      <mc:AlternateContent xmlns:mc="http://schemas.openxmlformats.org/markup-compatibility/2006">
-        <mc:Choice xmlns:p14="http://schemas.microsoft.com/office/powerpoint/2010/main" Requires="p14">
+      <mc:AlternateContent xmlns:mc="http://schemas.openxmlformats.org/markup-compatibility/2006" xmlns:p14="http://schemas.microsoft.com/office/powerpoint/2010/main">
+        <mc:Choice Requires="p14">
           <p:contentPart p14:bwMode="auto" r:id="rId46">
             <p14:nvContentPartPr>
               <p14:cNvPr id="41" name="Ink 40">
@@ -14154,7 +15699,7 @@
             </p14:xfrm>
           </p:contentPart>
         </mc:Choice>
-        <mc:Fallback>
+        <mc:Fallback xmlns="">
           <p:pic>
             <p:nvPicPr>
               <p:cNvPr id="41" name="Ink 40">
@@ -14185,8 +15730,8 @@
           </p:pic>
         </mc:Fallback>
       </mc:AlternateContent>
-      <mc:AlternateContent xmlns:mc="http://schemas.openxmlformats.org/markup-compatibility/2006">
-        <mc:Choice xmlns:p14="http://schemas.microsoft.com/office/powerpoint/2010/main" Requires="p14">
+      <mc:AlternateContent xmlns:mc="http://schemas.openxmlformats.org/markup-compatibility/2006" xmlns:p14="http://schemas.microsoft.com/office/powerpoint/2010/main">
+        <mc:Choice Requires="p14">
           <p:contentPart p14:bwMode="auto" r:id="rId48">
             <p14:nvContentPartPr>
               <p14:cNvPr id="43" name="Ink 42">
@@ -14205,7 +15750,7 @@
             </p14:xfrm>
           </p:contentPart>
         </mc:Choice>
-        <mc:Fallback>
+        <mc:Fallback xmlns="">
           <p:pic>
             <p:nvPicPr>
               <p:cNvPr id="43" name="Ink 42">
@@ -14236,8 +15781,8 @@
           </p:pic>
         </mc:Fallback>
       </mc:AlternateContent>
-      <mc:AlternateContent xmlns:mc="http://schemas.openxmlformats.org/markup-compatibility/2006">
-        <mc:Choice xmlns:p14="http://schemas.microsoft.com/office/powerpoint/2010/main" Requires="p14">
+      <mc:AlternateContent xmlns:mc="http://schemas.openxmlformats.org/markup-compatibility/2006" xmlns:p14="http://schemas.microsoft.com/office/powerpoint/2010/main">
+        <mc:Choice Requires="p14">
           <p:contentPart p14:bwMode="auto" r:id="rId49">
             <p14:nvContentPartPr>
               <p14:cNvPr id="44" name="Ink 43">
@@ -14256,7 +15801,7 @@
             </p14:xfrm>
           </p:contentPart>
         </mc:Choice>
-        <mc:Fallback>
+        <mc:Fallback xmlns="">
           <p:pic>
             <p:nvPicPr>
               <p:cNvPr id="44" name="Ink 43">
@@ -14287,8 +15832,8 @@
           </p:pic>
         </mc:Fallback>
       </mc:AlternateContent>
-      <mc:AlternateContent xmlns:mc="http://schemas.openxmlformats.org/markup-compatibility/2006">
-        <mc:Choice xmlns:p14="http://schemas.microsoft.com/office/powerpoint/2010/main" Requires="p14">
+      <mc:AlternateContent xmlns:mc="http://schemas.openxmlformats.org/markup-compatibility/2006" xmlns:p14="http://schemas.microsoft.com/office/powerpoint/2010/main">
+        <mc:Choice Requires="p14">
           <p:contentPart p14:bwMode="auto" r:id="rId51">
             <p14:nvContentPartPr>
               <p14:cNvPr id="45" name="Ink 44">
@@ -14307,7 +15852,7 @@
             </p14:xfrm>
           </p:contentPart>
         </mc:Choice>
-        <mc:Fallback>
+        <mc:Fallback xmlns="">
           <p:pic>
             <p:nvPicPr>
               <p:cNvPr id="45" name="Ink 44">
@@ -14338,8 +15883,8 @@
           </p:pic>
         </mc:Fallback>
       </mc:AlternateContent>
-      <mc:AlternateContent xmlns:mc="http://schemas.openxmlformats.org/markup-compatibility/2006">
-        <mc:Choice xmlns:p14="http://schemas.microsoft.com/office/powerpoint/2010/main" Requires="p14">
+      <mc:AlternateContent xmlns:mc="http://schemas.openxmlformats.org/markup-compatibility/2006" xmlns:p14="http://schemas.microsoft.com/office/powerpoint/2010/main">
+        <mc:Choice Requires="p14">
           <p:contentPart p14:bwMode="auto" r:id="rId53">
             <p14:nvContentPartPr>
               <p14:cNvPr id="46" name="Ink 45">
@@ -14358,7 +15903,7 @@
             </p14:xfrm>
           </p:contentPart>
         </mc:Choice>
-        <mc:Fallback>
+        <mc:Fallback xmlns="">
           <p:pic>
             <p:nvPicPr>
               <p:cNvPr id="46" name="Ink 45">
@@ -14389,8 +15934,8 @@
           </p:pic>
         </mc:Fallback>
       </mc:AlternateContent>
-      <mc:AlternateContent xmlns:mc="http://schemas.openxmlformats.org/markup-compatibility/2006">
-        <mc:Choice xmlns:p14="http://schemas.microsoft.com/office/powerpoint/2010/main" Requires="p14">
+      <mc:AlternateContent xmlns:mc="http://schemas.openxmlformats.org/markup-compatibility/2006" xmlns:p14="http://schemas.microsoft.com/office/powerpoint/2010/main">
+        <mc:Choice Requires="p14">
           <p:contentPart p14:bwMode="auto" r:id="rId55">
             <p14:nvContentPartPr>
               <p14:cNvPr id="47" name="Ink 46">
@@ -14409,7 +15954,7 @@
             </p14:xfrm>
           </p:contentPart>
         </mc:Choice>
-        <mc:Fallback>
+        <mc:Fallback xmlns="">
           <p:pic>
             <p:nvPicPr>
               <p:cNvPr id="47" name="Ink 46">
@@ -14440,8 +15985,8 @@
           </p:pic>
         </mc:Fallback>
       </mc:AlternateContent>
-      <mc:AlternateContent xmlns:mc="http://schemas.openxmlformats.org/markup-compatibility/2006">
-        <mc:Choice xmlns:p14="http://schemas.microsoft.com/office/powerpoint/2010/main" Requires="p14">
+      <mc:AlternateContent xmlns:mc="http://schemas.openxmlformats.org/markup-compatibility/2006" xmlns:p14="http://schemas.microsoft.com/office/powerpoint/2010/main">
+        <mc:Choice Requires="p14">
           <p:contentPart p14:bwMode="auto" r:id="rId57">
             <p14:nvContentPartPr>
               <p14:cNvPr id="48" name="Ink 47">
@@ -14460,7 +16005,7 @@
             </p14:xfrm>
           </p:contentPart>
         </mc:Choice>
-        <mc:Fallback>
+        <mc:Fallback xmlns="">
           <p:pic>
             <p:nvPicPr>
               <p:cNvPr id="48" name="Ink 47">
@@ -14491,8 +16036,8 @@
           </p:pic>
         </mc:Fallback>
       </mc:AlternateContent>
-      <mc:AlternateContent xmlns:mc="http://schemas.openxmlformats.org/markup-compatibility/2006">
-        <mc:Choice xmlns:p14="http://schemas.microsoft.com/office/powerpoint/2010/main" Requires="p14">
+      <mc:AlternateContent xmlns:mc="http://schemas.openxmlformats.org/markup-compatibility/2006" xmlns:p14="http://schemas.microsoft.com/office/powerpoint/2010/main">
+        <mc:Choice Requires="p14">
           <p:contentPart p14:bwMode="auto" r:id="rId59">
             <p14:nvContentPartPr>
               <p14:cNvPr id="49" name="Ink 48">
@@ -14511,7 +16056,7 @@
             </p14:xfrm>
           </p:contentPart>
         </mc:Choice>
-        <mc:Fallback>
+        <mc:Fallback xmlns="">
           <p:pic>
             <p:nvPicPr>
               <p:cNvPr id="49" name="Ink 48">
@@ -14542,8 +16087,8 @@
           </p:pic>
         </mc:Fallback>
       </mc:AlternateContent>
-      <mc:AlternateContent xmlns:mc="http://schemas.openxmlformats.org/markup-compatibility/2006">
-        <mc:Choice xmlns:p14="http://schemas.microsoft.com/office/powerpoint/2010/main" Requires="p14">
+      <mc:AlternateContent xmlns:mc="http://schemas.openxmlformats.org/markup-compatibility/2006" xmlns:p14="http://schemas.microsoft.com/office/powerpoint/2010/main">
+        <mc:Choice Requires="p14">
           <p:contentPart p14:bwMode="auto" r:id="rId61">
             <p14:nvContentPartPr>
               <p14:cNvPr id="50" name="Ink 49">
@@ -14562,7 +16107,7 @@
             </p14:xfrm>
           </p:contentPart>
         </mc:Choice>
-        <mc:Fallback>
+        <mc:Fallback xmlns="">
           <p:pic>
             <p:nvPicPr>
               <p:cNvPr id="50" name="Ink 49">
@@ -14593,8 +16138,8 @@
           </p:pic>
         </mc:Fallback>
       </mc:AlternateContent>
-      <mc:AlternateContent xmlns:mc="http://schemas.openxmlformats.org/markup-compatibility/2006">
-        <mc:Choice xmlns:p14="http://schemas.microsoft.com/office/powerpoint/2010/main" Requires="p14">
+      <mc:AlternateContent xmlns:mc="http://schemas.openxmlformats.org/markup-compatibility/2006" xmlns:p14="http://schemas.microsoft.com/office/powerpoint/2010/main">
+        <mc:Choice Requires="p14">
           <p:contentPart p14:bwMode="auto" r:id="rId63">
             <p14:nvContentPartPr>
               <p14:cNvPr id="51" name="Ink 50">
@@ -14613,7 +16158,7 @@
             </p14:xfrm>
           </p:contentPart>
         </mc:Choice>
-        <mc:Fallback>
+        <mc:Fallback xmlns="">
           <p:pic>
             <p:nvPicPr>
               <p:cNvPr id="51" name="Ink 50">
@@ -14644,8 +16189,8 @@
           </p:pic>
         </mc:Fallback>
       </mc:AlternateContent>
-      <mc:AlternateContent xmlns:mc="http://schemas.openxmlformats.org/markup-compatibility/2006">
-        <mc:Choice xmlns:p14="http://schemas.microsoft.com/office/powerpoint/2010/main" Requires="p14">
+      <mc:AlternateContent xmlns:mc="http://schemas.openxmlformats.org/markup-compatibility/2006" xmlns:p14="http://schemas.microsoft.com/office/powerpoint/2010/main">
+        <mc:Choice Requires="p14">
           <p:contentPart p14:bwMode="auto" r:id="rId65">
             <p14:nvContentPartPr>
               <p14:cNvPr id="52" name="Ink 51">
@@ -14664,7 +16209,7 @@
             </p14:xfrm>
           </p:contentPart>
         </mc:Choice>
-        <mc:Fallback>
+        <mc:Fallback xmlns="">
           <p:pic>
             <p:nvPicPr>
               <p:cNvPr id="52" name="Ink 51">
@@ -14695,8 +16240,8 @@
           </p:pic>
         </mc:Fallback>
       </mc:AlternateContent>
-      <mc:AlternateContent xmlns:mc="http://schemas.openxmlformats.org/markup-compatibility/2006">
-        <mc:Choice xmlns:p14="http://schemas.microsoft.com/office/powerpoint/2010/main" Requires="p14">
+      <mc:AlternateContent xmlns:mc="http://schemas.openxmlformats.org/markup-compatibility/2006" xmlns:p14="http://schemas.microsoft.com/office/powerpoint/2010/main">
+        <mc:Choice Requires="p14">
           <p:contentPart p14:bwMode="auto" r:id="rId67">
             <p14:nvContentPartPr>
               <p14:cNvPr id="53" name="Ink 52">
@@ -14715,7 +16260,7 @@
             </p14:xfrm>
           </p:contentPart>
         </mc:Choice>
-        <mc:Fallback>
+        <mc:Fallback xmlns="">
           <p:pic>
             <p:nvPicPr>
               <p:cNvPr id="53" name="Ink 52">
@@ -14746,8 +16291,8 @@
           </p:pic>
         </mc:Fallback>
       </mc:AlternateContent>
-      <mc:AlternateContent xmlns:mc="http://schemas.openxmlformats.org/markup-compatibility/2006">
-        <mc:Choice xmlns:p14="http://schemas.microsoft.com/office/powerpoint/2010/main" Requires="p14">
+      <mc:AlternateContent xmlns:mc="http://schemas.openxmlformats.org/markup-compatibility/2006" xmlns:p14="http://schemas.microsoft.com/office/powerpoint/2010/main">
+        <mc:Choice Requires="p14">
           <p:contentPart p14:bwMode="auto" r:id="rId69">
             <p14:nvContentPartPr>
               <p14:cNvPr id="54" name="Ink 53">
@@ -14766,7 +16311,7 @@
             </p14:xfrm>
           </p:contentPart>
         </mc:Choice>
-        <mc:Fallback>
+        <mc:Fallback xmlns="">
           <p:pic>
             <p:nvPicPr>
               <p:cNvPr id="54" name="Ink 53">
@@ -14797,8 +16342,8 @@
           </p:pic>
         </mc:Fallback>
       </mc:AlternateContent>
-      <mc:AlternateContent xmlns:mc="http://schemas.openxmlformats.org/markup-compatibility/2006">
-        <mc:Choice xmlns:p14="http://schemas.microsoft.com/office/powerpoint/2010/main" Requires="p14">
+      <mc:AlternateContent xmlns:mc="http://schemas.openxmlformats.org/markup-compatibility/2006" xmlns:p14="http://schemas.microsoft.com/office/powerpoint/2010/main">
+        <mc:Choice Requires="p14">
           <p:contentPart p14:bwMode="auto" r:id="rId71">
             <p14:nvContentPartPr>
               <p14:cNvPr id="55" name="Ink 54">
@@ -14817,7 +16362,7 @@
             </p14:xfrm>
           </p:contentPart>
         </mc:Choice>
-        <mc:Fallback>
+        <mc:Fallback xmlns="">
           <p:pic>
             <p:nvPicPr>
               <p:cNvPr id="55" name="Ink 54">
@@ -14848,8 +16393,8 @@
           </p:pic>
         </mc:Fallback>
       </mc:AlternateContent>
-      <mc:AlternateContent xmlns:mc="http://schemas.openxmlformats.org/markup-compatibility/2006">
-        <mc:Choice xmlns:p14="http://schemas.microsoft.com/office/powerpoint/2010/main" Requires="p14">
+      <mc:AlternateContent xmlns:mc="http://schemas.openxmlformats.org/markup-compatibility/2006" xmlns:p14="http://schemas.microsoft.com/office/powerpoint/2010/main">
+        <mc:Choice Requires="p14">
           <p:contentPart p14:bwMode="auto" r:id="rId73">
             <p14:nvContentPartPr>
               <p14:cNvPr id="56" name="Ink 55">
@@ -14868,7 +16413,7 @@
             </p14:xfrm>
           </p:contentPart>
         </mc:Choice>
-        <mc:Fallback>
+        <mc:Fallback xmlns="">
           <p:pic>
             <p:nvPicPr>
               <p:cNvPr id="56" name="Ink 55">
@@ -14899,8 +16444,8 @@
           </p:pic>
         </mc:Fallback>
       </mc:AlternateContent>
-      <mc:AlternateContent xmlns:mc="http://schemas.openxmlformats.org/markup-compatibility/2006">
-        <mc:Choice xmlns:p14="http://schemas.microsoft.com/office/powerpoint/2010/main" Requires="p14">
+      <mc:AlternateContent xmlns:mc="http://schemas.openxmlformats.org/markup-compatibility/2006" xmlns:p14="http://schemas.microsoft.com/office/powerpoint/2010/main">
+        <mc:Choice Requires="p14">
           <p:contentPart p14:bwMode="auto" r:id="rId75">
             <p14:nvContentPartPr>
               <p14:cNvPr id="57" name="Ink 56">
@@ -14919,7 +16464,7 @@
             </p14:xfrm>
           </p:contentPart>
         </mc:Choice>
-        <mc:Fallback>
+        <mc:Fallback xmlns="">
           <p:pic>
             <p:nvPicPr>
               <p:cNvPr id="57" name="Ink 56">
@@ -14950,8 +16495,8 @@
           </p:pic>
         </mc:Fallback>
       </mc:AlternateContent>
-      <mc:AlternateContent xmlns:mc="http://schemas.openxmlformats.org/markup-compatibility/2006">
-        <mc:Choice xmlns:p14="http://schemas.microsoft.com/office/powerpoint/2010/main" Requires="p14">
+      <mc:AlternateContent xmlns:mc="http://schemas.openxmlformats.org/markup-compatibility/2006" xmlns:p14="http://schemas.microsoft.com/office/powerpoint/2010/main">
+        <mc:Choice Requires="p14">
           <p:contentPart p14:bwMode="auto" r:id="rId77">
             <p14:nvContentPartPr>
               <p14:cNvPr id="58" name="Ink 57">
@@ -14970,7 +16515,7 @@
             </p14:xfrm>
           </p:contentPart>
         </mc:Choice>
-        <mc:Fallback>
+        <mc:Fallback xmlns="">
           <p:pic>
             <p:nvPicPr>
               <p:cNvPr id="58" name="Ink 57">
@@ -15001,8 +16546,8 @@
           </p:pic>
         </mc:Fallback>
       </mc:AlternateContent>
-      <mc:AlternateContent xmlns:mc="http://schemas.openxmlformats.org/markup-compatibility/2006">
-        <mc:Choice xmlns:p14="http://schemas.microsoft.com/office/powerpoint/2010/main" Requires="p14">
+      <mc:AlternateContent xmlns:mc="http://schemas.openxmlformats.org/markup-compatibility/2006" xmlns:p14="http://schemas.microsoft.com/office/powerpoint/2010/main">
+        <mc:Choice Requires="p14">
           <p:contentPart p14:bwMode="auto" r:id="rId79">
             <p14:nvContentPartPr>
               <p14:cNvPr id="59" name="Ink 58">
@@ -15021,7 +16566,7 @@
             </p14:xfrm>
           </p:contentPart>
         </mc:Choice>
-        <mc:Fallback>
+        <mc:Fallback xmlns="">
           <p:pic>
             <p:nvPicPr>
               <p:cNvPr id="59" name="Ink 58">
@@ -15052,8 +16597,8 @@
           </p:pic>
         </mc:Fallback>
       </mc:AlternateContent>
-      <mc:AlternateContent xmlns:mc="http://schemas.openxmlformats.org/markup-compatibility/2006">
-        <mc:Choice xmlns:p14="http://schemas.microsoft.com/office/powerpoint/2010/main" Requires="p14">
+      <mc:AlternateContent xmlns:mc="http://schemas.openxmlformats.org/markup-compatibility/2006" xmlns:p14="http://schemas.microsoft.com/office/powerpoint/2010/main">
+        <mc:Choice Requires="p14">
           <p:contentPart p14:bwMode="auto" r:id="rId81">
             <p14:nvContentPartPr>
               <p14:cNvPr id="60" name="Ink 59">
@@ -15072,7 +16617,7 @@
             </p14:xfrm>
           </p:contentPart>
         </mc:Choice>
-        <mc:Fallback>
+        <mc:Fallback xmlns="">
           <p:pic>
             <p:nvPicPr>
               <p:cNvPr id="60" name="Ink 59">
@@ -15103,8 +16648,8 @@
           </p:pic>
         </mc:Fallback>
       </mc:AlternateContent>
-      <mc:AlternateContent xmlns:mc="http://schemas.openxmlformats.org/markup-compatibility/2006">
-        <mc:Choice xmlns:p14="http://schemas.microsoft.com/office/powerpoint/2010/main" Requires="p14">
+      <mc:AlternateContent xmlns:mc="http://schemas.openxmlformats.org/markup-compatibility/2006" xmlns:p14="http://schemas.microsoft.com/office/powerpoint/2010/main">
+        <mc:Choice Requires="p14">
           <p:contentPart p14:bwMode="auto" r:id="rId82">
             <p14:nvContentPartPr>
               <p14:cNvPr id="61" name="Ink 60">
@@ -15123,7 +16668,7 @@
             </p14:xfrm>
           </p:contentPart>
         </mc:Choice>
-        <mc:Fallback>
+        <mc:Fallback xmlns="">
           <p:pic>
             <p:nvPicPr>
               <p:cNvPr id="61" name="Ink 60">
@@ -15154,8 +16699,8 @@
           </p:pic>
         </mc:Fallback>
       </mc:AlternateContent>
-      <mc:AlternateContent xmlns:mc="http://schemas.openxmlformats.org/markup-compatibility/2006">
-        <mc:Choice xmlns:p14="http://schemas.microsoft.com/office/powerpoint/2010/main" Requires="p14">
+      <mc:AlternateContent xmlns:mc="http://schemas.openxmlformats.org/markup-compatibility/2006" xmlns:p14="http://schemas.microsoft.com/office/powerpoint/2010/main">
+        <mc:Choice Requires="p14">
           <p:contentPart p14:bwMode="auto" r:id="rId84">
             <p14:nvContentPartPr>
               <p14:cNvPr id="62" name="Ink 61">
@@ -15174,7 +16719,7 @@
             </p14:xfrm>
           </p:contentPart>
         </mc:Choice>
-        <mc:Fallback>
+        <mc:Fallback xmlns="">
           <p:pic>
             <p:nvPicPr>
               <p:cNvPr id="62" name="Ink 61">
@@ -15205,8 +16750,8 @@
           </p:pic>
         </mc:Fallback>
       </mc:AlternateContent>
-      <mc:AlternateContent xmlns:mc="http://schemas.openxmlformats.org/markup-compatibility/2006">
-        <mc:Choice xmlns:p14="http://schemas.microsoft.com/office/powerpoint/2010/main" Requires="p14">
+      <mc:AlternateContent xmlns:mc="http://schemas.openxmlformats.org/markup-compatibility/2006" xmlns:p14="http://schemas.microsoft.com/office/powerpoint/2010/main">
+        <mc:Choice Requires="p14">
           <p:contentPart p14:bwMode="auto" r:id="rId86">
             <p14:nvContentPartPr>
               <p14:cNvPr id="63" name="Ink 62">
@@ -15225,7 +16770,7 @@
             </p14:xfrm>
           </p:contentPart>
         </mc:Choice>
-        <mc:Fallback>
+        <mc:Fallback xmlns="">
           <p:pic>
             <p:nvPicPr>
               <p:cNvPr id="63" name="Ink 62">
@@ -15256,8 +16801,8 @@
           </p:pic>
         </mc:Fallback>
       </mc:AlternateContent>
-      <mc:AlternateContent xmlns:mc="http://schemas.openxmlformats.org/markup-compatibility/2006">
-        <mc:Choice xmlns:p14="http://schemas.microsoft.com/office/powerpoint/2010/main" Requires="p14">
+      <mc:AlternateContent xmlns:mc="http://schemas.openxmlformats.org/markup-compatibility/2006" xmlns:p14="http://schemas.microsoft.com/office/powerpoint/2010/main">
+        <mc:Choice Requires="p14">
           <p:contentPart p14:bwMode="auto" r:id="rId88">
             <p14:nvContentPartPr>
               <p14:cNvPr id="65" name="Ink 64">
@@ -15276,7 +16821,7 @@
             </p14:xfrm>
           </p:contentPart>
         </mc:Choice>
-        <mc:Fallback>
+        <mc:Fallback xmlns="">
           <p:pic>
             <p:nvPicPr>
               <p:cNvPr id="65" name="Ink 64">
@@ -15327,8 +16872,8 @@
             <a:chExt cx="1524240" cy="231480"/>
           </a:xfrm>
         </p:grpSpPr>
-        <mc:AlternateContent xmlns:mc="http://schemas.openxmlformats.org/markup-compatibility/2006">
-          <mc:Choice xmlns:p14="http://schemas.microsoft.com/office/powerpoint/2010/main" Requires="p14">
+        <mc:AlternateContent xmlns:mc="http://schemas.openxmlformats.org/markup-compatibility/2006" xmlns:p14="http://schemas.microsoft.com/office/powerpoint/2010/main">
+          <mc:Choice Requires="p14">
             <p:contentPart p14:bwMode="auto" r:id="rId90">
               <p14:nvContentPartPr>
                 <p14:cNvPr id="34" name="Ink 33">
@@ -15347,7 +16892,7 @@
               </p14:xfrm>
             </p:contentPart>
           </mc:Choice>
-          <mc:Fallback>
+          <mc:Fallback xmlns="">
             <p:pic>
               <p:nvPicPr>
                 <p:cNvPr id="34" name="Ink 33">
@@ -15378,8 +16923,8 @@
             </p:pic>
           </mc:Fallback>
         </mc:AlternateContent>
-        <mc:AlternateContent xmlns:mc="http://schemas.openxmlformats.org/markup-compatibility/2006">
-          <mc:Choice xmlns:p14="http://schemas.microsoft.com/office/powerpoint/2010/main" Requires="p14">
+        <mc:AlternateContent xmlns:mc="http://schemas.openxmlformats.org/markup-compatibility/2006" xmlns:p14="http://schemas.microsoft.com/office/powerpoint/2010/main">
+          <mc:Choice Requires="p14">
             <p:contentPart p14:bwMode="auto" r:id="rId92">
               <p14:nvContentPartPr>
                 <p14:cNvPr id="35" name="Ink 34">
@@ -15398,7 +16943,7 @@
               </p14:xfrm>
             </p:contentPart>
           </mc:Choice>
-          <mc:Fallback>
+          <mc:Fallback xmlns="">
             <p:pic>
               <p:nvPicPr>
                 <p:cNvPr id="35" name="Ink 34">
@@ -15429,8 +16974,8 @@
             </p:pic>
           </mc:Fallback>
         </mc:AlternateContent>
-        <mc:AlternateContent xmlns:mc="http://schemas.openxmlformats.org/markup-compatibility/2006">
-          <mc:Choice xmlns:p14="http://schemas.microsoft.com/office/powerpoint/2010/main" Requires="p14">
+        <mc:AlternateContent xmlns:mc="http://schemas.openxmlformats.org/markup-compatibility/2006" xmlns:p14="http://schemas.microsoft.com/office/powerpoint/2010/main">
+          <mc:Choice Requires="p14">
             <p:contentPart p14:bwMode="auto" r:id="rId94">
               <p14:nvContentPartPr>
                 <p14:cNvPr id="66" name="Ink 65">
@@ -15449,7 +16994,7 @@
               </p14:xfrm>
             </p:contentPart>
           </mc:Choice>
-          <mc:Fallback>
+          <mc:Fallback xmlns="">
             <p:pic>
               <p:nvPicPr>
                 <p:cNvPr id="66" name="Ink 65">
@@ -15481,8 +17026,8 @@
           </mc:Fallback>
         </mc:AlternateContent>
       </p:grpSp>
-      <mc:AlternateContent xmlns:mc="http://schemas.openxmlformats.org/markup-compatibility/2006">
-        <mc:Choice xmlns:p14="http://schemas.microsoft.com/office/powerpoint/2010/main" Requires="p14">
+      <mc:AlternateContent xmlns:mc="http://schemas.openxmlformats.org/markup-compatibility/2006" xmlns:p14="http://schemas.microsoft.com/office/powerpoint/2010/main">
+        <mc:Choice Requires="p14">
           <p:contentPart p14:bwMode="auto" r:id="rId96">
             <p14:nvContentPartPr>
               <p14:cNvPr id="68" name="Ink 67">
@@ -15501,7 +17046,7 @@
             </p14:xfrm>
           </p:contentPart>
         </mc:Choice>
-        <mc:Fallback>
+        <mc:Fallback xmlns="">
           <p:pic>
             <p:nvPicPr>
               <p:cNvPr id="68" name="Ink 67">
@@ -15532,8 +17077,8 @@
           </p:pic>
         </mc:Fallback>
       </mc:AlternateContent>
-      <mc:AlternateContent xmlns:mc="http://schemas.openxmlformats.org/markup-compatibility/2006">
-        <mc:Choice xmlns:p14="http://schemas.microsoft.com/office/powerpoint/2010/main" Requires="p14">
+      <mc:AlternateContent xmlns:mc="http://schemas.openxmlformats.org/markup-compatibility/2006" xmlns:p14="http://schemas.microsoft.com/office/powerpoint/2010/main">
+        <mc:Choice Requires="p14">
           <p:contentPart p14:bwMode="auto" r:id="rId98">
             <p14:nvContentPartPr>
               <p14:cNvPr id="69" name="Ink 68">
@@ -15552,7 +17097,7 @@
             </p14:xfrm>
           </p:contentPart>
         </mc:Choice>
-        <mc:Fallback>
+        <mc:Fallback xmlns="">
           <p:pic>
             <p:nvPicPr>
               <p:cNvPr id="69" name="Ink 68">
@@ -15583,8 +17128,8 @@
           </p:pic>
         </mc:Fallback>
       </mc:AlternateContent>
-      <mc:AlternateContent xmlns:mc="http://schemas.openxmlformats.org/markup-compatibility/2006">
-        <mc:Choice xmlns:p14="http://schemas.microsoft.com/office/powerpoint/2010/main" Requires="p14">
+      <mc:AlternateContent xmlns:mc="http://schemas.openxmlformats.org/markup-compatibility/2006" xmlns:p14="http://schemas.microsoft.com/office/powerpoint/2010/main">
+        <mc:Choice Requires="p14">
           <p:contentPart p14:bwMode="auto" r:id="rId100">
             <p14:nvContentPartPr>
               <p14:cNvPr id="70" name="Ink 69">
@@ -15603,7 +17148,7 @@
             </p14:xfrm>
           </p:contentPart>
         </mc:Choice>
-        <mc:Fallback>
+        <mc:Fallback xmlns="">
           <p:pic>
             <p:nvPicPr>
               <p:cNvPr id="70" name="Ink 69">
@@ -15634,8 +17179,8 @@
           </p:pic>
         </mc:Fallback>
       </mc:AlternateContent>
-      <mc:AlternateContent xmlns:mc="http://schemas.openxmlformats.org/markup-compatibility/2006">
-        <mc:Choice xmlns:p14="http://schemas.microsoft.com/office/powerpoint/2010/main" Requires="p14">
+      <mc:AlternateContent xmlns:mc="http://schemas.openxmlformats.org/markup-compatibility/2006" xmlns:p14="http://schemas.microsoft.com/office/powerpoint/2010/main">
+        <mc:Choice Requires="p14">
           <p:contentPart p14:bwMode="auto" r:id="rId102">
             <p14:nvContentPartPr>
               <p14:cNvPr id="71" name="Ink 70">
@@ -15654,7 +17199,7 @@
             </p14:xfrm>
           </p:contentPart>
         </mc:Choice>
-        <mc:Fallback>
+        <mc:Fallback xmlns="">
           <p:pic>
             <p:nvPicPr>
               <p:cNvPr id="71" name="Ink 70">
@@ -15689,6 +17234,350 @@
     <p:extLst>
       <p:ext uri="{BB962C8B-B14F-4D97-AF65-F5344CB8AC3E}">
         <p14:creationId xmlns:p14="http://schemas.microsoft.com/office/powerpoint/2010/main" val="159453500"/>
+      </p:ext>
+    </p:extLst>
+  </p:cSld>
+  <p:clrMapOvr>
+    <a:masterClrMapping/>
+  </p:clrMapOvr>
+</p:sld>
+</file>
+
+<file path=ppt/slides/slide8.xml><?xml version="1.0" encoding="utf-8"?>
+<p:sld xmlns:a="http://schemas.openxmlformats.org/drawingml/2006/main" xmlns:r="http://schemas.openxmlformats.org/officeDocument/2006/relationships" xmlns:p="http://schemas.openxmlformats.org/presentationml/2006/main">
+  <p:cSld>
+    <p:spTree>
+      <p:nvGrpSpPr>
+        <p:cNvPr id="1" name=""/>
+        <p:cNvGrpSpPr/>
+        <p:nvPr/>
+      </p:nvGrpSpPr>
+      <p:grpSpPr>
+        <a:xfrm>
+          <a:off x="0" y="0"/>
+          <a:ext cx="0" cy="0"/>
+          <a:chOff x="0" y="0"/>
+          <a:chExt cx="0" cy="0"/>
+        </a:xfrm>
+      </p:grpSpPr>
+      <p:sp>
+        <p:nvSpPr>
+          <p:cNvPr id="2" name="Title 1">
+            <a:extLst>
+              <a:ext uri="{FF2B5EF4-FFF2-40B4-BE49-F238E27FC236}">
+                <a16:creationId xmlns:a16="http://schemas.microsoft.com/office/drawing/2014/main" id="{79CA74F4-23A2-0E1F-FFC9-0011C81E3BB6}"/>
+              </a:ext>
+            </a:extLst>
+          </p:cNvPr>
+          <p:cNvSpPr>
+            <a:spLocks noGrp="1"/>
+          </p:cNvSpPr>
+          <p:nvPr>
+            <p:ph type="title"/>
+          </p:nvPr>
+        </p:nvSpPr>
+        <p:spPr/>
+        <p:txBody>
+          <a:bodyPr/>
+          <a:lstStyle/>
+          <a:p>
+            <a:r>
+              <a:rPr lang="en-US" dirty="0"/>
+              <a:t>Lvl1-naïve 7d hold if 10dpospredany</a:t>
+            </a:r>
+          </a:p>
+        </p:txBody>
+      </p:sp>
+      <p:sp>
+        <p:nvSpPr>
+          <p:cNvPr id="3" name="Content Placeholder 2">
+            <a:extLst>
+              <a:ext uri="{FF2B5EF4-FFF2-40B4-BE49-F238E27FC236}">
+                <a16:creationId xmlns:a16="http://schemas.microsoft.com/office/drawing/2014/main" id="{C7D2C066-94E0-516E-5198-4F5BBDF94B6C}"/>
+              </a:ext>
+            </a:extLst>
+          </p:cNvPr>
+          <p:cNvSpPr>
+            <a:spLocks noGrp="1"/>
+          </p:cNvSpPr>
+          <p:nvPr>
+            <p:ph idx="1"/>
+          </p:nvPr>
+        </p:nvSpPr>
+        <p:spPr/>
+        <p:txBody>
+          <a:bodyPr/>
+          <a:lstStyle/>
+          <a:p>
+            <a:r>
+              <a:rPr lang="en-US" dirty="0"/>
+              <a:t>Tested on 1000 most recent pred+ non-nan trades w </a:t>
+            </a:r>
+            <a:r>
+              <a:rPr lang="en-US" dirty="0" err="1"/>
+              <a:t>filing_date</a:t>
+            </a:r>
+            <a:r>
+              <a:rPr lang="en-US" dirty="0"/>
+              <a:t> 5/29/2025-7/22/2025. $1 inv </a:t>
+            </a:r>
+            <a:r>
+              <a:rPr lang="en-US" dirty="0" err="1"/>
+              <a:t>ea</a:t>
+            </a:r>
+            <a:endParaRPr lang="en-US" dirty="0"/>
+          </a:p>
+          <a:p>
+            <a:r>
+              <a:rPr lang="en-US" dirty="0"/>
+              <a:t>Total </a:t>
+            </a:r>
+            <a:r>
+              <a:rPr lang="en-US" dirty="0" err="1"/>
+              <a:t>PnL</a:t>
+            </a:r>
+            <a:r>
+              <a:rPr lang="en-US" dirty="0"/>
+              <a:t>: $45.62 Winning trades: 573/1000 → Win %: 57.30%</a:t>
+            </a:r>
+          </a:p>
+        </p:txBody>
+      </p:sp>
+      <p:pic>
+        <p:nvPicPr>
+          <p:cNvPr id="5" name="Picture 4">
+            <a:extLst>
+              <a:ext uri="{FF2B5EF4-FFF2-40B4-BE49-F238E27FC236}">
+                <a16:creationId xmlns:a16="http://schemas.microsoft.com/office/drawing/2014/main" id="{BDE29845-E752-1F56-0AE3-E96F196420F0}"/>
+              </a:ext>
+            </a:extLst>
+          </p:cNvPr>
+          <p:cNvPicPr>
+            <a:picLocks noChangeAspect="1"/>
+          </p:cNvPicPr>
+          <p:nvPr/>
+        </p:nvPicPr>
+        <p:blipFill>
+          <a:blip r:embed="rId2"/>
+          <a:stretch>
+            <a:fillRect/>
+          </a:stretch>
+        </p:blipFill>
+        <p:spPr>
+          <a:xfrm>
+            <a:off x="1005175" y="3488046"/>
+            <a:ext cx="3556194" cy="2823854"/>
+          </a:xfrm>
+          <a:prstGeom prst="rect">
+            <a:avLst/>
+          </a:prstGeom>
+        </p:spPr>
+      </p:pic>
+      <p:pic>
+        <p:nvPicPr>
+          <p:cNvPr id="7" name="Picture 6">
+            <a:extLst>
+              <a:ext uri="{FF2B5EF4-FFF2-40B4-BE49-F238E27FC236}">
+                <a16:creationId xmlns:a16="http://schemas.microsoft.com/office/drawing/2014/main" id="{E2F3E3B0-53ED-BA67-2864-2A5C875C18E5}"/>
+              </a:ext>
+            </a:extLst>
+          </p:cNvPr>
+          <p:cNvPicPr>
+            <a:picLocks noChangeAspect="1"/>
+          </p:cNvPicPr>
+          <p:nvPr/>
+        </p:nvPicPr>
+        <p:blipFill>
+          <a:blip r:embed="rId3"/>
+          <a:stretch>
+            <a:fillRect/>
+          </a:stretch>
+        </p:blipFill>
+        <p:spPr>
+          <a:xfrm>
+            <a:off x="6709771" y="4001294"/>
+            <a:ext cx="3939881" cy="2606266"/>
+          </a:xfrm>
+          <a:prstGeom prst="rect">
+            <a:avLst/>
+          </a:prstGeom>
+        </p:spPr>
+      </p:pic>
+    </p:spTree>
+    <p:extLst>
+      <p:ext uri="{BB962C8B-B14F-4D97-AF65-F5344CB8AC3E}">
+        <p14:creationId xmlns:p14="http://schemas.microsoft.com/office/powerpoint/2010/main" val="3766865094"/>
+      </p:ext>
+    </p:extLst>
+  </p:cSld>
+  <p:clrMapOvr>
+    <a:masterClrMapping/>
+  </p:clrMapOvr>
+</p:sld>
+</file>
+
+<file path=ppt/slides/slide9.xml><?xml version="1.0" encoding="utf-8"?>
+<p:sld xmlns:a="http://schemas.openxmlformats.org/drawingml/2006/main" xmlns:r="http://schemas.openxmlformats.org/officeDocument/2006/relationships" xmlns:p="http://schemas.openxmlformats.org/presentationml/2006/main">
+  <p:cSld>
+    <p:spTree>
+      <p:nvGrpSpPr>
+        <p:cNvPr id="1" name="">
+          <a:extLst>
+            <a:ext uri="{FF2B5EF4-FFF2-40B4-BE49-F238E27FC236}">
+              <a16:creationId xmlns:a16="http://schemas.microsoft.com/office/drawing/2014/main" id="{E6726E41-B57F-4548-2D9A-D4046202D7D4}"/>
+            </a:ext>
+          </a:extLst>
+        </p:cNvPr>
+        <p:cNvGrpSpPr/>
+        <p:nvPr/>
+      </p:nvGrpSpPr>
+      <p:grpSpPr>
+        <a:xfrm>
+          <a:off x="0" y="0"/>
+          <a:ext cx="0" cy="0"/>
+          <a:chOff x="0" y="0"/>
+          <a:chExt cx="0" cy="0"/>
+        </a:xfrm>
+      </p:grpSpPr>
+      <p:sp>
+        <p:nvSpPr>
+          <p:cNvPr id="2" name="Title 1">
+            <a:extLst>
+              <a:ext uri="{FF2B5EF4-FFF2-40B4-BE49-F238E27FC236}">
+                <a16:creationId xmlns:a16="http://schemas.microsoft.com/office/drawing/2014/main" id="{B6DA9125-0134-99B1-E0DF-A8420C71306D}"/>
+              </a:ext>
+            </a:extLst>
+          </p:cNvPr>
+          <p:cNvSpPr>
+            <a:spLocks noGrp="1"/>
+          </p:cNvSpPr>
+          <p:nvPr>
+            <p:ph type="title"/>
+          </p:nvPr>
+        </p:nvSpPr>
+        <p:spPr/>
+        <p:txBody>
+          <a:bodyPr/>
+          <a:lstStyle/>
+          <a:p>
+            <a:r>
+              <a:rPr lang="en-US" dirty="0"/>
+              <a:t>Lvl2 – predpos10d, naive </a:t>
+            </a:r>
+            <a:r>
+              <a:rPr lang="en-US" dirty="0" err="1"/>
+              <a:t>freq</a:t>
+            </a:r>
+            <a:r>
+              <a:rPr lang="en-US" dirty="0"/>
+              <a:t>-based</a:t>
+            </a:r>
+          </a:p>
+        </p:txBody>
+      </p:sp>
+      <p:sp>
+        <p:nvSpPr>
+          <p:cNvPr id="3" name="Content Placeholder 2">
+            <a:extLst>
+              <a:ext uri="{FF2B5EF4-FFF2-40B4-BE49-F238E27FC236}">
+                <a16:creationId xmlns:a16="http://schemas.microsoft.com/office/drawing/2014/main" id="{71820B07-BD5C-F322-78BE-4B961BB09777}"/>
+              </a:ext>
+            </a:extLst>
+          </p:cNvPr>
+          <p:cNvSpPr>
+            <a:spLocks noGrp="1"/>
+          </p:cNvSpPr>
+          <p:nvPr>
+            <p:ph idx="1"/>
+          </p:nvPr>
+        </p:nvSpPr>
+        <p:spPr/>
+        <p:txBody>
+          <a:bodyPr/>
+          <a:lstStyle/>
+          <a:p>
+            <a:r>
+              <a:rPr lang="en-US" dirty="0"/>
+              <a:t>GPT hard carry. Going to redo manually </a:t>
+            </a:r>
+            <a:r>
+              <a:rPr lang="en-US" dirty="0" err="1"/>
+              <a:t>cuz</a:t>
+            </a:r>
+            <a:r>
+              <a:rPr lang="en-US" dirty="0"/>
+              <a:t> it doesn’t work and it can’t be visualized or checked…</a:t>
+            </a:r>
+          </a:p>
+          <a:p>
+            <a:endParaRPr lang="en-US" dirty="0"/>
+          </a:p>
+        </p:txBody>
+      </p:sp>
+      <p:pic>
+        <p:nvPicPr>
+          <p:cNvPr id="5" name="Picture 4">
+            <a:extLst>
+              <a:ext uri="{FF2B5EF4-FFF2-40B4-BE49-F238E27FC236}">
+                <a16:creationId xmlns:a16="http://schemas.microsoft.com/office/drawing/2014/main" id="{4546F518-56DA-508E-AB9D-478823560385}"/>
+              </a:ext>
+            </a:extLst>
+          </p:cNvPr>
+          <p:cNvPicPr>
+            <a:picLocks noChangeAspect="1"/>
+          </p:cNvPicPr>
+          <p:nvPr/>
+        </p:nvPicPr>
+        <p:blipFill>
+          <a:blip r:embed="rId2"/>
+          <a:stretch>
+            <a:fillRect/>
+          </a:stretch>
+        </p:blipFill>
+        <p:spPr>
+          <a:xfrm>
+            <a:off x="4507092" y="2769813"/>
+            <a:ext cx="3177815" cy="1318374"/>
+          </a:xfrm>
+          <a:prstGeom prst="rect">
+            <a:avLst/>
+          </a:prstGeom>
+        </p:spPr>
+      </p:pic>
+      <p:pic>
+        <p:nvPicPr>
+          <p:cNvPr id="7" name="Picture 6">
+            <a:extLst>
+              <a:ext uri="{FF2B5EF4-FFF2-40B4-BE49-F238E27FC236}">
+                <a16:creationId xmlns:a16="http://schemas.microsoft.com/office/drawing/2014/main" id="{11E1F3BF-CBD1-2FC6-49D8-ECCF330B3C00}"/>
+              </a:ext>
+            </a:extLst>
+          </p:cNvPr>
+          <p:cNvPicPr>
+            <a:picLocks noChangeAspect="1"/>
+          </p:cNvPicPr>
+          <p:nvPr/>
+        </p:nvPicPr>
+        <p:blipFill>
+          <a:blip r:embed="rId3"/>
+          <a:stretch>
+            <a:fillRect/>
+          </a:stretch>
+        </p:blipFill>
+        <p:spPr>
+          <a:xfrm>
+            <a:off x="2635465" y="4497572"/>
+            <a:ext cx="3743254" cy="2089629"/>
+          </a:xfrm>
+          <a:prstGeom prst="rect">
+            <a:avLst/>
+          </a:prstGeom>
+        </p:spPr>
+      </p:pic>
+    </p:spTree>
+    <p:extLst>
+      <p:ext uri="{BB962C8B-B14F-4D97-AF65-F5344CB8AC3E}">
+        <p14:creationId xmlns:p14="http://schemas.microsoft.com/office/powerpoint/2010/main" val="2338821943"/>
       </p:ext>
     </p:extLst>
   </p:cSld>

</xml_diff>